<commit_message>
Improve SQL theory and exercices
</commit_message>
<xml_diff>
--- a/Exercices SQL.pptx
+++ b/Exercices SQL.pptx
@@ -5,7 +5,7 @@
     <p:sldMasterId id="2147483648" r:id="rId1"/>
   </p:sldMasterIdLst>
   <p:notesMasterIdLst>
-    <p:notesMasterId r:id="rId20"/>
+    <p:notesMasterId r:id="rId26"/>
   </p:notesMasterIdLst>
   <p:sldIdLst>
     <p:sldId id="264" r:id="rId2"/>
@@ -23,9 +23,15 @@
     <p:sldId id="259" r:id="rId14"/>
     <p:sldId id="273" r:id="rId15"/>
     <p:sldId id="260" r:id="rId16"/>
-    <p:sldId id="261" r:id="rId17"/>
-    <p:sldId id="262" r:id="rId18"/>
-    <p:sldId id="263" r:id="rId19"/>
+    <p:sldId id="274" r:id="rId17"/>
+    <p:sldId id="275" r:id="rId18"/>
+    <p:sldId id="277" r:id="rId19"/>
+    <p:sldId id="276" r:id="rId20"/>
+    <p:sldId id="278" r:id="rId21"/>
+    <p:sldId id="261" r:id="rId22"/>
+    <p:sldId id="262" r:id="rId23"/>
+    <p:sldId id="263" r:id="rId24"/>
+    <p:sldId id="279" r:id="rId25"/>
   </p:sldIdLst>
   <p:sldSz cx="12192000" cy="6858000"/>
   <p:notesSz cx="6858000" cy="9144000"/>
@@ -214,7 +220,7 @@
           <a:p>
             <a:fld id="{5E73C5D7-919D-4BDD-AE43-DC3A70FDFE9F}" type="datetimeFigureOut">
               <a:rPr lang="fr-BE" smtClean="0"/>
-              <a:t>25-12-22</a:t>
+              <a:t>03-01-23</a:t>
             </a:fld>
             <a:endParaRPr lang="fr-BE"/>
           </a:p>
@@ -631,7 +637,7 @@
           <a:p>
             <a:fld id="{47F13D19-8A6F-448B-8613-9530819FB28C}" type="datetimeFigureOut">
               <a:rPr lang="fr-BE" smtClean="0"/>
-              <a:t>25-12-22</a:t>
+              <a:t>03-01-23</a:t>
             </a:fld>
             <a:endParaRPr lang="fr-BE"/>
           </a:p>
@@ -831,7 +837,7 @@
           <a:p>
             <a:fld id="{47F13D19-8A6F-448B-8613-9530819FB28C}" type="datetimeFigureOut">
               <a:rPr lang="fr-BE" smtClean="0"/>
-              <a:t>25-12-22</a:t>
+              <a:t>03-01-23</a:t>
             </a:fld>
             <a:endParaRPr lang="fr-BE"/>
           </a:p>
@@ -1041,7 +1047,7 @@
           <a:p>
             <a:fld id="{47F13D19-8A6F-448B-8613-9530819FB28C}" type="datetimeFigureOut">
               <a:rPr lang="fr-BE" smtClean="0"/>
-              <a:t>25-12-22</a:t>
+              <a:t>03-01-23</a:t>
             </a:fld>
             <a:endParaRPr lang="fr-BE"/>
           </a:p>
@@ -1241,7 +1247,7 @@
           <a:p>
             <a:fld id="{47F13D19-8A6F-448B-8613-9530819FB28C}" type="datetimeFigureOut">
               <a:rPr lang="fr-BE" smtClean="0"/>
-              <a:t>25-12-22</a:t>
+              <a:t>03-01-23</a:t>
             </a:fld>
             <a:endParaRPr lang="fr-BE"/>
           </a:p>
@@ -1517,7 +1523,7 @@
           <a:p>
             <a:fld id="{47F13D19-8A6F-448B-8613-9530819FB28C}" type="datetimeFigureOut">
               <a:rPr lang="fr-BE" smtClean="0"/>
-              <a:t>25-12-22</a:t>
+              <a:t>03-01-23</a:t>
             </a:fld>
             <a:endParaRPr lang="fr-BE"/>
           </a:p>
@@ -1785,7 +1791,7 @@
           <a:p>
             <a:fld id="{47F13D19-8A6F-448B-8613-9530819FB28C}" type="datetimeFigureOut">
               <a:rPr lang="fr-BE" smtClean="0"/>
-              <a:t>25-12-22</a:t>
+              <a:t>03-01-23</a:t>
             </a:fld>
             <a:endParaRPr lang="fr-BE"/>
           </a:p>
@@ -2200,7 +2206,7 @@
           <a:p>
             <a:fld id="{47F13D19-8A6F-448B-8613-9530819FB28C}" type="datetimeFigureOut">
               <a:rPr lang="fr-BE" smtClean="0"/>
-              <a:t>25-12-22</a:t>
+              <a:t>03-01-23</a:t>
             </a:fld>
             <a:endParaRPr lang="fr-BE"/>
           </a:p>
@@ -2342,7 +2348,7 @@
           <a:p>
             <a:fld id="{47F13D19-8A6F-448B-8613-9530819FB28C}" type="datetimeFigureOut">
               <a:rPr lang="fr-BE" smtClean="0"/>
-              <a:t>25-12-22</a:t>
+              <a:t>03-01-23</a:t>
             </a:fld>
             <a:endParaRPr lang="fr-BE"/>
           </a:p>
@@ -2455,7 +2461,7 @@
           <a:p>
             <a:fld id="{47F13D19-8A6F-448B-8613-9530819FB28C}" type="datetimeFigureOut">
               <a:rPr lang="fr-BE" smtClean="0"/>
-              <a:t>25-12-22</a:t>
+              <a:t>03-01-23</a:t>
             </a:fld>
             <a:endParaRPr lang="fr-BE"/>
           </a:p>
@@ -2768,7 +2774,7 @@
           <a:p>
             <a:fld id="{47F13D19-8A6F-448B-8613-9530819FB28C}" type="datetimeFigureOut">
               <a:rPr lang="fr-BE" smtClean="0"/>
-              <a:t>25-12-22</a:t>
+              <a:t>03-01-23</a:t>
             </a:fld>
             <a:endParaRPr lang="fr-BE"/>
           </a:p>
@@ -3057,7 +3063,7 @@
           <a:p>
             <a:fld id="{47F13D19-8A6F-448B-8613-9530819FB28C}" type="datetimeFigureOut">
               <a:rPr lang="fr-BE" smtClean="0"/>
-              <a:t>25-12-22</a:t>
+              <a:t>03-01-23</a:t>
             </a:fld>
             <a:endParaRPr lang="fr-BE"/>
           </a:p>
@@ -3300,7 +3306,7 @@
           <a:p>
             <a:fld id="{47F13D19-8A6F-448B-8613-9530819FB28C}" type="datetimeFigureOut">
               <a:rPr lang="fr-BE" smtClean="0"/>
-              <a:t>25-12-22</a:t>
+              <a:t>03-01-23</a:t>
             </a:fld>
             <a:endParaRPr lang="fr-BE"/>
           </a:p>
@@ -8249,7 +8255,7 @@
           <p:cNvPr id="2" name="Titre 1">
             <a:extLst>
               <a:ext uri="{FF2B5EF4-FFF2-40B4-BE49-F238E27FC236}">
-                <a16:creationId xmlns:a16="http://schemas.microsoft.com/office/drawing/2014/main" id="{ADDB7C44-9336-D776-2903-110B3EB8B74E}"/>
+                <a16:creationId xmlns:a16="http://schemas.microsoft.com/office/drawing/2014/main" id="{3F98CC91-1FFC-ABA7-BB0D-D5F5B8A947A9}"/>
               </a:ext>
             </a:extLst>
           </p:cNvPr>
@@ -8267,7 +8273,7 @@
           <a:p>
             <a:r>
               <a:rPr lang="fr-FR" dirty="0"/>
-              <a:t>SELECT exercices</a:t>
+              <a:t>SELECT</a:t>
             </a:r>
             <a:endParaRPr lang="fr-BE" dirty="0"/>
           </a:p>
@@ -8278,7 +8284,7 @@
           <p:cNvPr id="3" name="Espace réservé du contenu 2">
             <a:extLst>
               <a:ext uri="{FF2B5EF4-FFF2-40B4-BE49-F238E27FC236}">
-                <a16:creationId xmlns:a16="http://schemas.microsoft.com/office/drawing/2014/main" id="{E8DB991F-9E81-A53D-BD63-54736ED881DA}"/>
+                <a16:creationId xmlns:a16="http://schemas.microsoft.com/office/drawing/2014/main" id="{39EDEADF-0ABE-C041-042F-B4E9F81B0EE1}"/>
               </a:ext>
             </a:extLst>
           </p:cNvPr>
@@ -8291,282 +8297,342 @@
         </p:nvSpPr>
         <p:spPr/>
         <p:txBody>
-          <a:bodyPr>
-            <a:normAutofit/>
+          <a:bodyPr/>
+          <a:lstStyle/>
+          <a:p>
+            <a:r>
+              <a:rPr lang="fr-FR" dirty="0"/>
+              <a:t>La commande SELECT permet de récupérer des données stockées dans la base de données</a:t>
+            </a:r>
+          </a:p>
+          <a:p>
+            <a:r>
+              <a:rPr lang="fr-FR" dirty="0"/>
+              <a:t>Syntaxe: </a:t>
+            </a:r>
+          </a:p>
+          <a:p>
+            <a:endParaRPr lang="fr-FR" dirty="0"/>
+          </a:p>
+          <a:p>
+            <a:endParaRPr lang="fr-FR" dirty="0"/>
+          </a:p>
+          <a:p>
+            <a:r>
+              <a:rPr lang="fr-FR" dirty="0"/>
+              <a:t>Exemple: </a:t>
+            </a:r>
+          </a:p>
+          <a:p>
+            <a:endParaRPr lang="fr-FR" dirty="0"/>
+          </a:p>
+          <a:p>
+            <a:r>
+              <a:rPr lang="fr-FR" dirty="0"/>
+              <a:t>Plus d’infos sur: </a:t>
+            </a:r>
+            <a:r>
+              <a:rPr lang="fr-FR" dirty="0">
+                <a:hlinkClick r:id="rId2"/>
+              </a:rPr>
+              <a:t>https://www.w3schools.com/mysql/mysql_select.asp</a:t>
+            </a:r>
+            <a:r>
+              <a:rPr lang="fr-FR" dirty="0"/>
+              <a:t> </a:t>
+            </a:r>
+            <a:endParaRPr lang="fr-BE" dirty="0"/>
+          </a:p>
+        </p:txBody>
+      </p:sp>
+      <p:sp>
+        <p:nvSpPr>
+          <p:cNvPr id="4" name="ZoneTexte 3">
+            <a:extLst>
+              <a:ext uri="{FF2B5EF4-FFF2-40B4-BE49-F238E27FC236}">
+                <a16:creationId xmlns:a16="http://schemas.microsoft.com/office/drawing/2014/main" id="{83E0F470-5B0C-CDFB-2809-D22453C45684}"/>
+              </a:ext>
+            </a:extLst>
+          </p:cNvPr>
+          <p:cNvSpPr txBox="1"/>
+          <p:nvPr/>
+        </p:nvSpPr>
+        <p:spPr>
+          <a:xfrm>
+            <a:off x="1083074" y="3222594"/>
+            <a:ext cx="4509857" cy="707886"/>
+          </a:xfrm>
+          <a:prstGeom prst="rect">
+            <a:avLst/>
+          </a:prstGeom>
+          <a:noFill/>
+        </p:spPr>
+        <p:txBody>
+          <a:bodyPr wrap="square" rtlCol="0">
+            <a:spAutoFit/>
           </a:bodyPr>
           <a:lstStyle/>
           <a:p>
             <a:r>
-              <a:rPr lang="fr-FR" dirty="0"/>
-              <a:t>Select all </a:t>
-            </a:r>
-            <a:r>
-              <a:rPr lang="fr-FR" dirty="0" err="1"/>
-              <a:t>players</a:t>
-            </a:r>
-            <a:r>
-              <a:rPr lang="fr-FR" dirty="0"/>
-              <a:t> (id, </a:t>
-            </a:r>
-            <a:r>
-              <a:rPr lang="fr-FR" dirty="0" err="1"/>
-              <a:t>name</a:t>
-            </a:r>
-            <a:r>
-              <a:rPr lang="fr-FR" dirty="0"/>
-              <a:t>, </a:t>
-            </a:r>
-            <a:r>
-              <a:rPr lang="fr-FR" dirty="0" err="1"/>
-              <a:t>first_name</a:t>
-            </a:r>
-            <a:r>
-              <a:rPr lang="fr-FR" dirty="0"/>
-              <a:t> and </a:t>
-            </a:r>
-            <a:r>
-              <a:rPr lang="fr-FR" dirty="0" err="1"/>
-              <a:t>bib_number</a:t>
-            </a:r>
-            <a:r>
-              <a:rPr lang="fr-FR" dirty="0"/>
-              <a:t>)</a:t>
-            </a:r>
-          </a:p>
-          <a:p>
-            <a:r>
-              <a:rPr lang="fr-FR" dirty="0"/>
-              <a:t>Select </a:t>
-            </a:r>
-            <a:r>
-              <a:rPr lang="fr-FR" dirty="0" err="1"/>
-              <a:t>only</a:t>
-            </a:r>
-            <a:r>
-              <a:rPr lang="fr-FR" dirty="0"/>
-              <a:t> the </a:t>
-            </a:r>
-            <a:r>
-              <a:rPr lang="fr-FR" dirty="0" err="1"/>
-              <a:t>players</a:t>
-            </a:r>
-            <a:r>
-              <a:rPr lang="fr-FR" dirty="0"/>
-              <a:t> </a:t>
-            </a:r>
-            <a:r>
-              <a:rPr lang="fr-FR" dirty="0" err="1"/>
-              <a:t>with</a:t>
-            </a:r>
-            <a:r>
-              <a:rPr lang="fr-FR" dirty="0"/>
-              <a:t> a </a:t>
-            </a:r>
-            <a:r>
-              <a:rPr lang="fr-FR" dirty="0" err="1"/>
-              <a:t>name</a:t>
-            </a:r>
-            <a:r>
-              <a:rPr lang="fr-FR" dirty="0"/>
-              <a:t> </a:t>
-            </a:r>
-            <a:r>
-              <a:rPr lang="fr-FR" dirty="0" err="1"/>
-              <a:t>starting</a:t>
-            </a:r>
-            <a:r>
-              <a:rPr lang="fr-FR" dirty="0"/>
-              <a:t> by ‘A’</a:t>
-            </a:r>
-          </a:p>
-          <a:p>
-            <a:r>
-              <a:rPr lang="fr-FR" dirty="0"/>
-              <a:t>Select </a:t>
-            </a:r>
-            <a:r>
-              <a:rPr lang="fr-FR" dirty="0" err="1"/>
-              <a:t>only</a:t>
-            </a:r>
-            <a:r>
-              <a:rPr lang="fr-FR" dirty="0"/>
-              <a:t> the </a:t>
-            </a:r>
-            <a:r>
-              <a:rPr lang="fr-FR" dirty="0" err="1"/>
-              <a:t>players</a:t>
-            </a:r>
-            <a:r>
-              <a:rPr lang="fr-FR" dirty="0"/>
-              <a:t> </a:t>
-            </a:r>
-            <a:r>
-              <a:rPr lang="fr-FR" dirty="0" err="1"/>
-              <a:t>with</a:t>
-            </a:r>
-            <a:r>
-              <a:rPr lang="fr-FR" dirty="0"/>
-              <a:t> a ‘a’ </a:t>
-            </a:r>
-            <a:r>
-              <a:rPr lang="fr-FR" dirty="0" err="1"/>
-              <a:t>inside</a:t>
-            </a:r>
-            <a:r>
-              <a:rPr lang="fr-FR" dirty="0"/>
-              <a:t> </a:t>
-            </a:r>
-            <a:r>
-              <a:rPr lang="fr-FR" dirty="0" err="1"/>
-              <a:t>their</a:t>
-            </a:r>
-            <a:r>
-              <a:rPr lang="fr-FR" dirty="0"/>
-              <a:t> </a:t>
-            </a:r>
-            <a:r>
-              <a:rPr lang="fr-FR" dirty="0" err="1"/>
-              <a:t>name</a:t>
-            </a:r>
-            <a:endParaRPr lang="fr-FR" dirty="0"/>
-          </a:p>
-          <a:p>
-            <a:r>
-              <a:rPr lang="fr-FR" dirty="0"/>
-              <a:t>Select the </a:t>
-            </a:r>
-            <a:r>
-              <a:rPr lang="fr-FR" dirty="0" err="1"/>
-              <a:t>players</a:t>
-            </a:r>
-            <a:r>
-              <a:rPr lang="fr-FR" dirty="0"/>
-              <a:t> </a:t>
-            </a:r>
-            <a:r>
-              <a:rPr lang="fr-FR" dirty="0" err="1"/>
-              <a:t>with</a:t>
-            </a:r>
-            <a:r>
-              <a:rPr lang="fr-FR" dirty="0"/>
-              <a:t> </a:t>
-            </a:r>
-            <a:r>
-              <a:rPr lang="fr-FR" dirty="0" err="1"/>
-              <a:t>their</a:t>
-            </a:r>
-            <a:r>
-              <a:rPr lang="fr-FR" dirty="0"/>
-              <a:t> </a:t>
-            </a:r>
-            <a:r>
-              <a:rPr lang="fr-FR" dirty="0" err="1"/>
-              <a:t>team’s</a:t>
-            </a:r>
-            <a:r>
-              <a:rPr lang="fr-FR" dirty="0"/>
-              <a:t> </a:t>
-            </a:r>
-            <a:r>
-              <a:rPr lang="fr-FR" dirty="0" err="1"/>
-              <a:t>name</a:t>
-            </a:r>
-            <a:r>
-              <a:rPr lang="fr-FR" dirty="0"/>
-              <a:t> and </a:t>
-            </a:r>
-            <a:r>
-              <a:rPr lang="fr-FR" dirty="0" err="1"/>
-              <a:t>color</a:t>
-            </a:r>
-            <a:endParaRPr lang="fr-FR" dirty="0"/>
-          </a:p>
-          <a:p>
-            <a:r>
-              <a:rPr lang="fr-FR" dirty="0"/>
-              <a:t>Select all the </a:t>
-            </a:r>
-            <a:r>
-              <a:rPr lang="fr-FR" dirty="0" err="1"/>
-              <a:t>team’s</a:t>
-            </a:r>
-            <a:r>
-              <a:rPr lang="fr-FR" dirty="0"/>
-              <a:t> countries but the must </a:t>
-            </a:r>
-            <a:r>
-              <a:rPr lang="fr-FR" dirty="0" err="1"/>
-              <a:t>appear</a:t>
-            </a:r>
-            <a:r>
-              <a:rPr lang="fr-FR" dirty="0"/>
-              <a:t> </a:t>
-            </a:r>
-            <a:r>
-              <a:rPr lang="fr-FR" dirty="0" err="1"/>
-              <a:t>only</a:t>
-            </a:r>
-            <a:r>
-              <a:rPr lang="fr-FR" dirty="0"/>
-              <a:t> once.</a:t>
-            </a:r>
-          </a:p>
-          <a:p>
-            <a:r>
-              <a:rPr lang="fr-FR" dirty="0"/>
-              <a:t>Select the matches </a:t>
-            </a:r>
-            <a:r>
-              <a:rPr lang="fr-FR" dirty="0" err="1"/>
-              <a:t>planned</a:t>
-            </a:r>
-            <a:r>
-              <a:rPr lang="fr-FR" dirty="0"/>
-              <a:t> in the future</a:t>
-            </a:r>
-          </a:p>
-          <a:p>
-            <a:r>
-              <a:rPr lang="fr-FR" dirty="0"/>
-              <a:t>Select the </a:t>
-            </a:r>
-            <a:r>
-              <a:rPr lang="fr-FR" dirty="0" err="1"/>
-              <a:t>finished</a:t>
-            </a:r>
-            <a:r>
-              <a:rPr lang="fr-FR" dirty="0"/>
-              <a:t> matches</a:t>
-            </a:r>
-          </a:p>
-          <a:p>
-            <a:r>
-              <a:rPr lang="fr-FR" dirty="0"/>
-              <a:t>Select all the </a:t>
-            </a:r>
-            <a:r>
-              <a:rPr lang="fr-FR" dirty="0" err="1"/>
-              <a:t>players</a:t>
-            </a:r>
-            <a:r>
-              <a:rPr lang="fr-FR" dirty="0"/>
-              <a:t> </a:t>
-            </a:r>
-            <a:r>
-              <a:rPr lang="fr-FR" dirty="0" err="1"/>
-              <a:t>involved</a:t>
-            </a:r>
-            <a:r>
-              <a:rPr lang="fr-FR" dirty="0"/>
-              <a:t> in a match via </a:t>
-            </a:r>
-            <a:r>
-              <a:rPr lang="fr-FR" dirty="0" err="1"/>
-              <a:t>their</a:t>
-            </a:r>
-            <a:r>
-              <a:rPr lang="fr-FR" dirty="0"/>
-              <a:t> team. </a:t>
+              <a:rPr lang="en-US" sz="2000" dirty="0">
+                <a:solidFill>
+                  <a:srgbClr val="0000CD"/>
+                </a:solidFill>
+                <a:effectLst/>
+                <a:latin typeface="Courier New" panose="02070309020205020404" pitchFamily="49" charset="0"/>
+                <a:cs typeface="Courier New" panose="02070309020205020404" pitchFamily="49" charset="0"/>
+              </a:rPr>
+              <a:t>SELECT</a:t>
+            </a:r>
+            <a:r>
+              <a:rPr lang="en-US" sz="2000" dirty="0">
+                <a:solidFill>
+                  <a:srgbClr val="000000"/>
+                </a:solidFill>
+                <a:effectLst/>
+                <a:latin typeface="Courier New" panose="02070309020205020404" pitchFamily="49" charset="0"/>
+                <a:cs typeface="Courier New" panose="02070309020205020404" pitchFamily="49" charset="0"/>
+              </a:rPr>
+              <a:t> </a:t>
+            </a:r>
+            <a:r>
+              <a:rPr lang="en-US" sz="2000" i="1" dirty="0">
+                <a:solidFill>
+                  <a:srgbClr val="000000"/>
+                </a:solidFill>
+                <a:effectLst/>
+                <a:latin typeface="Courier New" panose="02070309020205020404" pitchFamily="49" charset="0"/>
+                <a:cs typeface="Courier New" panose="02070309020205020404" pitchFamily="49" charset="0"/>
+              </a:rPr>
+              <a:t>column1</a:t>
+            </a:r>
+            <a:r>
+              <a:rPr lang="en-US" sz="2000" dirty="0">
+                <a:solidFill>
+                  <a:srgbClr val="000000"/>
+                </a:solidFill>
+                <a:effectLst/>
+                <a:latin typeface="Courier New" panose="02070309020205020404" pitchFamily="49" charset="0"/>
+                <a:cs typeface="Courier New" panose="02070309020205020404" pitchFamily="49" charset="0"/>
+              </a:rPr>
+              <a:t>,</a:t>
+            </a:r>
+            <a:r>
+              <a:rPr lang="en-US" sz="2000" i="1" dirty="0">
+                <a:solidFill>
+                  <a:srgbClr val="000000"/>
+                </a:solidFill>
+                <a:effectLst/>
+                <a:latin typeface="Courier New" panose="02070309020205020404" pitchFamily="49" charset="0"/>
+                <a:cs typeface="Courier New" panose="02070309020205020404" pitchFamily="49" charset="0"/>
+              </a:rPr>
+              <a:t> column2, ...</a:t>
+            </a:r>
+            <a:br>
+              <a:rPr lang="en-US" sz="2000" dirty="0">
+                <a:solidFill>
+                  <a:srgbClr val="000000"/>
+                </a:solidFill>
+                <a:effectLst/>
+                <a:latin typeface="Courier New" panose="02070309020205020404" pitchFamily="49" charset="0"/>
+                <a:cs typeface="Courier New" panose="02070309020205020404" pitchFamily="49" charset="0"/>
+              </a:rPr>
+            </a:br>
+            <a:r>
+              <a:rPr lang="en-US" sz="2000" dirty="0">
+                <a:solidFill>
+                  <a:srgbClr val="0000CD"/>
+                </a:solidFill>
+                <a:effectLst/>
+                <a:latin typeface="Courier New" panose="02070309020205020404" pitchFamily="49" charset="0"/>
+                <a:cs typeface="Courier New" panose="02070309020205020404" pitchFamily="49" charset="0"/>
+              </a:rPr>
+              <a:t>FROM</a:t>
+            </a:r>
+            <a:r>
+              <a:rPr lang="en-US" sz="2000" dirty="0">
+                <a:solidFill>
+                  <a:srgbClr val="000000"/>
+                </a:solidFill>
+                <a:effectLst/>
+                <a:latin typeface="Courier New" panose="02070309020205020404" pitchFamily="49" charset="0"/>
+                <a:cs typeface="Courier New" panose="02070309020205020404" pitchFamily="49" charset="0"/>
+              </a:rPr>
+              <a:t> </a:t>
+            </a:r>
+            <a:r>
+              <a:rPr lang="en-US" sz="2000" i="1" dirty="0" err="1">
+                <a:solidFill>
+                  <a:srgbClr val="000000"/>
+                </a:solidFill>
+                <a:effectLst/>
+                <a:latin typeface="Courier New" panose="02070309020205020404" pitchFamily="49" charset="0"/>
+                <a:cs typeface="Courier New" panose="02070309020205020404" pitchFamily="49" charset="0"/>
+              </a:rPr>
+              <a:t>table_name</a:t>
+            </a:r>
+            <a:r>
+              <a:rPr lang="en-US" sz="2000" dirty="0">
+                <a:solidFill>
+                  <a:srgbClr val="000000"/>
+                </a:solidFill>
+                <a:effectLst/>
+                <a:latin typeface="Courier New" panose="02070309020205020404" pitchFamily="49" charset="0"/>
+                <a:cs typeface="Courier New" panose="02070309020205020404" pitchFamily="49" charset="0"/>
+              </a:rPr>
+              <a:t>; </a:t>
+            </a:r>
+            <a:endParaRPr lang="fr-BE" sz="2000" dirty="0">
+              <a:latin typeface="Courier New" panose="02070309020205020404" pitchFamily="49" charset="0"/>
+              <a:cs typeface="Courier New" panose="02070309020205020404" pitchFamily="49" charset="0"/>
+            </a:endParaRPr>
+          </a:p>
+        </p:txBody>
+      </p:sp>
+      <p:sp>
+        <p:nvSpPr>
+          <p:cNvPr id="6" name="ZoneTexte 5">
+            <a:extLst>
+              <a:ext uri="{FF2B5EF4-FFF2-40B4-BE49-F238E27FC236}">
+                <a16:creationId xmlns:a16="http://schemas.microsoft.com/office/drawing/2014/main" id="{9940AACD-3DE7-5E13-A229-EC0D3B116B91}"/>
+              </a:ext>
+            </a:extLst>
+          </p:cNvPr>
+          <p:cNvSpPr txBox="1"/>
+          <p:nvPr/>
+        </p:nvSpPr>
+        <p:spPr>
+          <a:xfrm>
+            <a:off x="1083074" y="4730556"/>
+            <a:ext cx="5974713" cy="646331"/>
+          </a:xfrm>
+          <a:prstGeom prst="rect">
+            <a:avLst/>
+          </a:prstGeom>
+          <a:noFill/>
+        </p:spPr>
+        <p:txBody>
+          <a:bodyPr wrap="none" rtlCol="0">
+            <a:spAutoFit/>
+          </a:bodyPr>
+          <a:lstStyle/>
+          <a:p>
+            <a:r>
+              <a:rPr lang="en-US" sz="1800" b="1" i="0" u="none" strike="noStrike" baseline="0" dirty="0">
+                <a:solidFill>
+                  <a:srgbClr val="0000FF"/>
+                </a:solidFill>
+                <a:latin typeface="Courier New" panose="02070309020205020404" pitchFamily="49" charset="0"/>
+              </a:rPr>
+              <a:t>SELECT</a:t>
+            </a:r>
+            <a:r>
+              <a:rPr lang="en-US" sz="1800" b="0" i="0" u="none" strike="noStrike" baseline="0" dirty="0">
+                <a:solidFill>
+                  <a:srgbClr val="000000"/>
+                </a:solidFill>
+                <a:latin typeface="Courier New" panose="02070309020205020404" pitchFamily="49" charset="0"/>
+              </a:rPr>
+              <a:t> </a:t>
+            </a:r>
+            <a:r>
+              <a:rPr lang="en-US" sz="1800" b="0" i="0" u="none" strike="noStrike" baseline="0" dirty="0">
+                <a:solidFill>
+                  <a:srgbClr val="808000"/>
+                </a:solidFill>
+                <a:latin typeface="Courier New" panose="02070309020205020404" pitchFamily="49" charset="0"/>
+              </a:rPr>
+              <a:t>`id`</a:t>
+            </a:r>
+            <a:r>
+              <a:rPr lang="en-US" sz="1800" b="0" i="0" u="none" strike="noStrike" baseline="0" dirty="0">
+                <a:solidFill>
+                  <a:srgbClr val="0000FF"/>
+                </a:solidFill>
+                <a:latin typeface="Courier New" panose="02070309020205020404" pitchFamily="49" charset="0"/>
+              </a:rPr>
+              <a:t>,</a:t>
+            </a:r>
+            <a:r>
+              <a:rPr lang="en-US" sz="1800" b="0" i="0" u="none" strike="noStrike" baseline="0" dirty="0">
+                <a:solidFill>
+                  <a:srgbClr val="000000"/>
+                </a:solidFill>
+                <a:latin typeface="Courier New" panose="02070309020205020404" pitchFamily="49" charset="0"/>
+              </a:rPr>
+              <a:t> </a:t>
+            </a:r>
+            <a:r>
+              <a:rPr lang="en-US" sz="1800" b="0" i="0" u="none" strike="noStrike" baseline="0" dirty="0">
+                <a:solidFill>
+                  <a:srgbClr val="808000"/>
+                </a:solidFill>
+                <a:latin typeface="Courier New" panose="02070309020205020404" pitchFamily="49" charset="0"/>
+              </a:rPr>
+              <a:t>`title`</a:t>
+            </a:r>
+            <a:r>
+              <a:rPr lang="en-US" sz="1800" b="0" i="0" u="none" strike="noStrike" baseline="0" dirty="0">
+                <a:solidFill>
+                  <a:srgbClr val="0000FF"/>
+                </a:solidFill>
+                <a:latin typeface="Courier New" panose="02070309020205020404" pitchFamily="49" charset="0"/>
+              </a:rPr>
+              <a:t>,</a:t>
+            </a:r>
+            <a:r>
+              <a:rPr lang="en-US" sz="1800" b="0" i="0" u="none" strike="noStrike" baseline="0" dirty="0">
+                <a:solidFill>
+                  <a:srgbClr val="000000"/>
+                </a:solidFill>
+                <a:latin typeface="Courier New" panose="02070309020205020404" pitchFamily="49" charset="0"/>
+              </a:rPr>
+              <a:t> </a:t>
+            </a:r>
+            <a:r>
+              <a:rPr lang="en-US" sz="1800" b="0" i="0" u="none" strike="noStrike" baseline="0" dirty="0">
+                <a:solidFill>
+                  <a:srgbClr val="808000"/>
+                </a:solidFill>
+                <a:latin typeface="Courier New" panose="02070309020205020404" pitchFamily="49" charset="0"/>
+              </a:rPr>
+              <a:t>`types`</a:t>
+            </a:r>
+            <a:r>
+              <a:rPr lang="en-US" sz="1800" b="0" i="0" u="none" strike="noStrike" baseline="0" dirty="0">
+                <a:solidFill>
+                  <a:srgbClr val="000000"/>
+                </a:solidFill>
+                <a:latin typeface="Courier New" panose="02070309020205020404" pitchFamily="49" charset="0"/>
+              </a:rPr>
+              <a:t> </a:t>
+            </a:r>
+            <a:r>
+              <a:rPr lang="en-US" sz="1800" b="1" i="0" u="none" strike="noStrike" baseline="0" dirty="0">
+                <a:solidFill>
+                  <a:srgbClr val="0000FF"/>
+                </a:solidFill>
+                <a:latin typeface="Courier New" panose="02070309020205020404" pitchFamily="49" charset="0"/>
+              </a:rPr>
+              <a:t>FROM</a:t>
+            </a:r>
+            <a:r>
+              <a:rPr lang="en-US" sz="1800" b="0" i="0" u="none" strike="noStrike" baseline="0" dirty="0">
+                <a:solidFill>
+                  <a:srgbClr val="000000"/>
+                </a:solidFill>
+                <a:latin typeface="Courier New" panose="02070309020205020404" pitchFamily="49" charset="0"/>
+              </a:rPr>
+              <a:t> </a:t>
+            </a:r>
+            <a:r>
+              <a:rPr lang="en-US" sz="1800" b="0" i="0" u="none" strike="noStrike" baseline="0" dirty="0">
+                <a:solidFill>
+                  <a:srgbClr val="808000"/>
+                </a:solidFill>
+                <a:latin typeface="Courier New" panose="02070309020205020404" pitchFamily="49" charset="0"/>
+              </a:rPr>
+              <a:t>`games`</a:t>
             </a:r>
           </a:p>
           <a:p>
@@ -8577,7 +8643,7 @@
     </p:spTree>
     <p:extLst>
       <p:ext uri="{BB962C8B-B14F-4D97-AF65-F5344CB8AC3E}">
-        <p14:creationId xmlns:p14="http://schemas.microsoft.com/office/powerpoint/2010/main" val="3283928943"/>
+        <p14:creationId xmlns:p14="http://schemas.microsoft.com/office/powerpoint/2010/main" val="1221428866"/>
       </p:ext>
     </p:extLst>
   </p:cSld>
@@ -8609,7 +8675,7 @@
           <p:cNvPr id="2" name="Titre 1">
             <a:extLst>
               <a:ext uri="{FF2B5EF4-FFF2-40B4-BE49-F238E27FC236}">
-                <a16:creationId xmlns:a16="http://schemas.microsoft.com/office/drawing/2014/main" id="{D80988B8-63C7-3E7E-9FF5-806DC9675523}"/>
+                <a16:creationId xmlns:a16="http://schemas.microsoft.com/office/drawing/2014/main" id="{33EA8E7B-A731-8BD3-3D8F-D537CEDAD9EF}"/>
               </a:ext>
             </a:extLst>
           </p:cNvPr>
@@ -8627,7 +8693,7 @@
           <a:p>
             <a:r>
               <a:rPr lang="fr-FR" dirty="0"/>
-              <a:t>More select exercices</a:t>
+              <a:t>Clause WHERE</a:t>
             </a:r>
             <a:endParaRPr lang="fr-BE" dirty="0"/>
           </a:p>
@@ -8638,7 +8704,7 @@
           <p:cNvPr id="3" name="Espace réservé du contenu 2">
             <a:extLst>
               <a:ext uri="{FF2B5EF4-FFF2-40B4-BE49-F238E27FC236}">
-                <a16:creationId xmlns:a16="http://schemas.microsoft.com/office/drawing/2014/main" id="{BC7B860A-B6BD-AD7A-FD88-FFF46E6CBAB4}"/>
+                <a16:creationId xmlns:a16="http://schemas.microsoft.com/office/drawing/2014/main" id="{48056FE8-9505-8FBC-5E44-FD6C0ED4B3DD}"/>
               </a:ext>
             </a:extLst>
           </p:cNvPr>
@@ -8651,194 +8717,442 @@
         </p:nvSpPr>
         <p:spPr/>
         <p:txBody>
-          <a:bodyPr/>
+          <a:bodyPr>
+            <a:normAutofit fontScale="92500"/>
+          </a:bodyPr>
           <a:lstStyle/>
           <a:p>
             <a:r>
-              <a:rPr lang="fr-FR" dirty="0" err="1"/>
-              <a:t>Find</a:t>
-            </a:r>
-            <a:r>
               <a:rPr lang="fr-FR" dirty="0"/>
-              <a:t> the </a:t>
-            </a:r>
-            <a:r>
-              <a:rPr lang="fr-FR" dirty="0" err="1"/>
-              <a:t>highest</a:t>
-            </a:r>
+              <a:t>A utiliser avec un SELECT, UPDATE ou DELETE</a:t>
+            </a:r>
+          </a:p>
+          <a:p>
             <a:r>
               <a:rPr lang="fr-FR" dirty="0"/>
-              <a:t> score of the </a:t>
-            </a:r>
-            <a:r>
-              <a:rPr lang="fr-FR" dirty="0" err="1"/>
-              <a:t>tournament</a:t>
-            </a:r>
+              <a:t>Permet de filtrer les données</a:t>
+            </a:r>
+          </a:p>
+          <a:p>
             <a:r>
               <a:rPr lang="fr-FR" dirty="0"/>
-              <a:t> and select the </a:t>
-            </a:r>
-            <a:r>
-              <a:rPr lang="fr-FR" dirty="0" err="1"/>
-              <a:t>corresponding</a:t>
-            </a:r>
+              <a:t>Syntaxe:</a:t>
+            </a:r>
+          </a:p>
+          <a:p>
+            <a:endParaRPr lang="fr-FR" dirty="0"/>
+          </a:p>
+          <a:p>
+            <a:endParaRPr lang="fr-FR" dirty="0"/>
+          </a:p>
+          <a:p>
             <a:r>
               <a:rPr lang="fr-FR" dirty="0"/>
-              <a:t> </a:t>
-            </a:r>
-            <a:r>
-              <a:rPr lang="fr-FR" dirty="0" err="1"/>
-              <a:t>game</a:t>
-            </a:r>
+              <a:t>Exemple:</a:t>
+            </a:r>
+          </a:p>
+          <a:p>
+            <a:pPr marL="0" indent="0">
+              <a:buNone/>
+            </a:pPr>
+            <a:endParaRPr lang="fr-FR" dirty="0"/>
+          </a:p>
+          <a:p>
+            <a:endParaRPr lang="fr-FR" dirty="0"/>
+          </a:p>
+          <a:p>
             <a:r>
               <a:rPr lang="fr-FR" dirty="0"/>
-              <a:t> </a:t>
-            </a:r>
-            <a:r>
-              <a:rPr lang="fr-FR" dirty="0" err="1"/>
-              <a:t>it</a:t>
+              <a:t>Plus d’infos sur: </a:t>
+            </a:r>
+            <a:r>
+              <a:rPr lang="fr-FR" dirty="0">
+                <a:hlinkClick r:id="rId2"/>
+              </a:rPr>
+              <a:t>https://www.w3schools.com/mysql/mysql_where.asp</a:t>
             </a:r>
             <a:r>
               <a:rPr lang="fr-FR" dirty="0"/>
               <a:t> </a:t>
             </a:r>
-            <a:r>
-              <a:rPr lang="fr-FR" dirty="0" err="1"/>
-              <a:t>was</a:t>
-            </a:r>
-            <a:r>
-              <a:rPr lang="fr-FR" dirty="0"/>
-              <a:t> for.</a:t>
-            </a:r>
-          </a:p>
-          <a:p>
-            <a:r>
-              <a:rPr lang="fr-FR" dirty="0" err="1"/>
-              <a:t>Create</a:t>
-            </a:r>
-            <a:r>
-              <a:rPr lang="fr-FR" dirty="0"/>
-              <a:t> a </a:t>
-            </a:r>
-            <a:r>
-              <a:rPr lang="fr-FR" dirty="0" err="1"/>
-              <a:t>query</a:t>
-            </a:r>
-            <a:r>
-              <a:rPr lang="fr-FR" dirty="0"/>
-              <a:t> </a:t>
-            </a:r>
-            <a:r>
-              <a:rPr lang="fr-FR" dirty="0" err="1"/>
-              <a:t>that</a:t>
-            </a:r>
-            <a:r>
-              <a:rPr lang="fr-FR" dirty="0"/>
-              <a:t> display the match </a:t>
-            </a:r>
-            <a:r>
-              <a:rPr lang="fr-FR" dirty="0" err="1"/>
-              <a:t>schedule</a:t>
-            </a:r>
-            <a:r>
-              <a:rPr lang="fr-FR" dirty="0"/>
-              <a:t> for a team. </a:t>
-            </a:r>
-            <a:r>
-              <a:rPr lang="fr-FR" dirty="0" err="1"/>
-              <a:t>Add</a:t>
-            </a:r>
-            <a:r>
-              <a:rPr lang="fr-FR" dirty="0"/>
-              <a:t> the </a:t>
-            </a:r>
-            <a:r>
-              <a:rPr lang="fr-FR" dirty="0" err="1"/>
-              <a:t>game</a:t>
-            </a:r>
-            <a:r>
-              <a:rPr lang="fr-FR" dirty="0"/>
-              <a:t>, the room and the referee information</a:t>
-            </a:r>
-          </a:p>
-          <a:p>
-            <a:r>
-              <a:rPr lang="fr-FR" dirty="0" err="1"/>
-              <a:t>Create</a:t>
-            </a:r>
-            <a:r>
-              <a:rPr lang="fr-FR" dirty="0"/>
-              <a:t> a </a:t>
-            </a:r>
-            <a:r>
-              <a:rPr lang="fr-FR" dirty="0" err="1"/>
-              <a:t>query</a:t>
-            </a:r>
-            <a:r>
-              <a:rPr lang="fr-FR" dirty="0"/>
-              <a:t> </a:t>
-            </a:r>
-            <a:r>
-              <a:rPr lang="fr-FR" dirty="0" err="1"/>
-              <a:t>that</a:t>
-            </a:r>
-            <a:r>
-              <a:rPr lang="fr-FR" dirty="0"/>
-              <a:t> display the match </a:t>
-            </a:r>
-            <a:r>
-              <a:rPr lang="fr-FR" dirty="0" err="1"/>
-              <a:t>schedule</a:t>
-            </a:r>
-            <a:r>
-              <a:rPr lang="fr-FR" dirty="0"/>
-              <a:t> for a </a:t>
-            </a:r>
-            <a:r>
-              <a:rPr lang="fr-FR" dirty="0" err="1"/>
-              <a:t>player</a:t>
-            </a:r>
-            <a:r>
-              <a:rPr lang="fr-FR" dirty="0"/>
-              <a:t>.</a:t>
-            </a:r>
-          </a:p>
-          <a:p>
-            <a:r>
-              <a:rPr lang="fr-FR" dirty="0" err="1"/>
-              <a:t>Find</a:t>
-            </a:r>
-            <a:r>
-              <a:rPr lang="fr-FR" dirty="0"/>
-              <a:t> </a:t>
-            </a:r>
-            <a:r>
-              <a:rPr lang="fr-FR" dirty="0" err="1"/>
-              <a:t>which</a:t>
-            </a:r>
-            <a:r>
-              <a:rPr lang="fr-FR" dirty="0"/>
-              <a:t> team </a:t>
-            </a:r>
-            <a:r>
-              <a:rPr lang="fr-FR" dirty="0" err="1"/>
-              <a:t>scored</a:t>
-            </a:r>
-            <a:r>
-              <a:rPr lang="fr-FR" dirty="0"/>
-              <a:t> the </a:t>
-            </a:r>
-            <a:r>
-              <a:rPr lang="fr-FR" dirty="0" err="1"/>
-              <a:t>most</a:t>
-            </a:r>
-            <a:r>
-              <a:rPr lang="fr-FR" dirty="0"/>
-              <a:t> at ‘Dota 2’</a:t>
-            </a:r>
           </a:p>
           <a:p>
             <a:endParaRPr lang="fr-FR" dirty="0"/>
+          </a:p>
+          <a:p>
+            <a:endParaRPr lang="fr-FR" dirty="0"/>
+          </a:p>
+          <a:p>
+            <a:endParaRPr lang="fr-BE" dirty="0"/>
+          </a:p>
+        </p:txBody>
+      </p:sp>
+      <p:sp>
+        <p:nvSpPr>
+          <p:cNvPr id="4" name="ZoneTexte 3">
+            <a:extLst>
+              <a:ext uri="{FF2B5EF4-FFF2-40B4-BE49-F238E27FC236}">
+                <a16:creationId xmlns:a16="http://schemas.microsoft.com/office/drawing/2014/main" id="{34709AE5-B428-E2FA-1E52-4F83836A586F}"/>
+              </a:ext>
+            </a:extLst>
+          </p:cNvPr>
+          <p:cNvSpPr txBox="1"/>
+          <p:nvPr/>
+        </p:nvSpPr>
+        <p:spPr>
+          <a:xfrm>
+            <a:off x="1091952" y="3326104"/>
+            <a:ext cx="3639845" cy="923330"/>
+          </a:xfrm>
+          <a:prstGeom prst="rect">
+            <a:avLst/>
+          </a:prstGeom>
+          <a:noFill/>
+        </p:spPr>
+        <p:txBody>
+          <a:bodyPr wrap="square" rtlCol="0">
+            <a:spAutoFit/>
+          </a:bodyPr>
+          <a:lstStyle/>
+          <a:p>
+            <a:r>
+              <a:rPr lang="en-US" dirty="0">
+                <a:solidFill>
+                  <a:srgbClr val="0000CD"/>
+                </a:solidFill>
+                <a:effectLst/>
+              </a:rPr>
+              <a:t>SELECT</a:t>
+            </a:r>
+            <a:r>
+              <a:rPr lang="en-US" dirty="0">
+                <a:solidFill>
+                  <a:srgbClr val="000000"/>
+                </a:solidFill>
+                <a:effectLst/>
+              </a:rPr>
+              <a:t> </a:t>
+            </a:r>
+            <a:r>
+              <a:rPr lang="en-US" i="1" dirty="0">
+                <a:solidFill>
+                  <a:srgbClr val="000000"/>
+                </a:solidFill>
+                <a:effectLst/>
+              </a:rPr>
+              <a:t>column1</a:t>
+            </a:r>
+            <a:r>
+              <a:rPr lang="en-US" dirty="0">
+                <a:solidFill>
+                  <a:srgbClr val="000000"/>
+                </a:solidFill>
+                <a:effectLst/>
+              </a:rPr>
+              <a:t>,</a:t>
+            </a:r>
+            <a:r>
+              <a:rPr lang="en-US" i="1" dirty="0">
+                <a:solidFill>
+                  <a:srgbClr val="000000"/>
+                </a:solidFill>
+                <a:effectLst/>
+              </a:rPr>
+              <a:t> column2, ...</a:t>
+            </a:r>
+            <a:br>
+              <a:rPr lang="en-US" dirty="0">
+                <a:solidFill>
+                  <a:srgbClr val="000000"/>
+                </a:solidFill>
+                <a:effectLst/>
+              </a:rPr>
+            </a:br>
+            <a:r>
+              <a:rPr lang="en-US" dirty="0">
+                <a:solidFill>
+                  <a:srgbClr val="0000CD"/>
+                </a:solidFill>
+                <a:effectLst/>
+              </a:rPr>
+              <a:t>FROM</a:t>
+            </a:r>
+            <a:r>
+              <a:rPr lang="en-US" dirty="0">
+                <a:solidFill>
+                  <a:srgbClr val="000000"/>
+                </a:solidFill>
+                <a:effectLst/>
+              </a:rPr>
+              <a:t> </a:t>
+            </a:r>
+            <a:r>
+              <a:rPr lang="en-US" i="1" dirty="0" err="1">
+                <a:solidFill>
+                  <a:srgbClr val="000000"/>
+                </a:solidFill>
+                <a:effectLst/>
+              </a:rPr>
+              <a:t>table_name</a:t>
+            </a:r>
+            <a:br>
+              <a:rPr lang="en-US" dirty="0">
+                <a:solidFill>
+                  <a:srgbClr val="000000"/>
+                </a:solidFill>
+                <a:effectLst/>
+              </a:rPr>
+            </a:br>
+            <a:r>
+              <a:rPr lang="en-US" dirty="0">
+                <a:solidFill>
+                  <a:srgbClr val="0000CD"/>
+                </a:solidFill>
+                <a:effectLst/>
+              </a:rPr>
+              <a:t>WHERE</a:t>
+            </a:r>
+            <a:r>
+              <a:rPr lang="en-US" dirty="0">
+                <a:solidFill>
+                  <a:srgbClr val="000000"/>
+                </a:solidFill>
+                <a:effectLst/>
+              </a:rPr>
+              <a:t> </a:t>
+            </a:r>
+            <a:r>
+              <a:rPr lang="en-US" i="1" dirty="0">
+                <a:solidFill>
+                  <a:srgbClr val="000000"/>
+                </a:solidFill>
+                <a:effectLst/>
+              </a:rPr>
+              <a:t>condition</a:t>
+            </a:r>
+            <a:r>
+              <a:rPr lang="en-US" dirty="0">
+                <a:solidFill>
+                  <a:srgbClr val="000000"/>
+                </a:solidFill>
+                <a:effectLst/>
+              </a:rPr>
+              <a:t>; </a:t>
+            </a:r>
+            <a:endParaRPr lang="fr-BE" dirty="0"/>
+          </a:p>
+        </p:txBody>
+      </p:sp>
+      <p:sp>
+        <p:nvSpPr>
+          <p:cNvPr id="6" name="ZoneTexte 5">
+            <a:extLst>
+              <a:ext uri="{FF2B5EF4-FFF2-40B4-BE49-F238E27FC236}">
+                <a16:creationId xmlns:a16="http://schemas.microsoft.com/office/drawing/2014/main" id="{FC47BA40-4F56-4AA9-306B-5E19E98F206E}"/>
+              </a:ext>
+            </a:extLst>
+          </p:cNvPr>
+          <p:cNvSpPr txBox="1"/>
+          <p:nvPr/>
+        </p:nvSpPr>
+        <p:spPr>
+          <a:xfrm>
+            <a:off x="1091952" y="4802981"/>
+            <a:ext cx="6178860" cy="923330"/>
+          </a:xfrm>
+          <a:prstGeom prst="rect">
+            <a:avLst/>
+          </a:prstGeom>
+          <a:noFill/>
+        </p:spPr>
+        <p:txBody>
+          <a:bodyPr wrap="square" rtlCol="0">
+            <a:spAutoFit/>
+          </a:bodyPr>
+          <a:lstStyle/>
+          <a:p>
+            <a:r>
+              <a:rPr lang="en-US" sz="1800" b="1" i="0" u="none" strike="noStrike" baseline="0" dirty="0">
+                <a:solidFill>
+                  <a:srgbClr val="0000FF"/>
+                </a:solidFill>
+                <a:latin typeface="Courier New" panose="02070309020205020404" pitchFamily="49" charset="0"/>
+              </a:rPr>
+              <a:t>SELECT</a:t>
+            </a:r>
+            <a:r>
+              <a:rPr lang="en-US" sz="1800" b="0" i="0" u="none" strike="noStrike" baseline="0" dirty="0">
+                <a:solidFill>
+                  <a:srgbClr val="000000"/>
+                </a:solidFill>
+                <a:latin typeface="Courier New" panose="02070309020205020404" pitchFamily="49" charset="0"/>
+              </a:rPr>
+              <a:t> </a:t>
+            </a:r>
+            <a:r>
+              <a:rPr lang="en-US" sz="1800" b="0" i="0" u="none" strike="noStrike" baseline="0" dirty="0">
+                <a:solidFill>
+                  <a:srgbClr val="808000"/>
+                </a:solidFill>
+                <a:latin typeface="Courier New" panose="02070309020205020404" pitchFamily="49" charset="0"/>
+              </a:rPr>
+              <a:t>`id`</a:t>
+            </a:r>
+            <a:r>
+              <a:rPr lang="en-US" sz="1800" b="0" i="0" u="none" strike="noStrike" baseline="0" dirty="0">
+                <a:solidFill>
+                  <a:srgbClr val="0000FF"/>
+                </a:solidFill>
+                <a:latin typeface="Courier New" panose="02070309020205020404" pitchFamily="49" charset="0"/>
+              </a:rPr>
+              <a:t>,</a:t>
+            </a:r>
+            <a:r>
+              <a:rPr lang="en-US" sz="1800" b="0" i="0" u="none" strike="noStrike" baseline="0" dirty="0">
+                <a:solidFill>
+                  <a:srgbClr val="000000"/>
+                </a:solidFill>
+                <a:latin typeface="Courier New" panose="02070309020205020404" pitchFamily="49" charset="0"/>
+              </a:rPr>
+              <a:t> </a:t>
+            </a:r>
+            <a:r>
+              <a:rPr lang="en-US" sz="1800" b="0" i="0" u="none" strike="noStrike" baseline="0" dirty="0">
+                <a:solidFill>
+                  <a:srgbClr val="808000"/>
+                </a:solidFill>
+                <a:latin typeface="Courier New" panose="02070309020205020404" pitchFamily="49" charset="0"/>
+              </a:rPr>
+              <a:t>`title`</a:t>
+            </a:r>
+            <a:r>
+              <a:rPr lang="en-US" sz="1800" b="0" i="0" u="none" strike="noStrike" baseline="0" dirty="0">
+                <a:solidFill>
+                  <a:srgbClr val="0000FF"/>
+                </a:solidFill>
+                <a:latin typeface="Courier New" panose="02070309020205020404" pitchFamily="49" charset="0"/>
+              </a:rPr>
+              <a:t>,</a:t>
+            </a:r>
+            <a:r>
+              <a:rPr lang="en-US" sz="1800" b="0" i="0" u="none" strike="noStrike" baseline="0" dirty="0">
+                <a:solidFill>
+                  <a:srgbClr val="000000"/>
+                </a:solidFill>
+                <a:latin typeface="Courier New" panose="02070309020205020404" pitchFamily="49" charset="0"/>
+              </a:rPr>
+              <a:t> </a:t>
+            </a:r>
+            <a:r>
+              <a:rPr lang="en-US" sz="1800" b="0" i="0" u="none" strike="noStrike" baseline="0" dirty="0">
+                <a:solidFill>
+                  <a:srgbClr val="808000"/>
+                </a:solidFill>
+                <a:latin typeface="Courier New" panose="02070309020205020404" pitchFamily="49" charset="0"/>
+              </a:rPr>
+              <a:t>`types`</a:t>
+            </a:r>
+            <a:r>
+              <a:rPr lang="en-US" sz="1800" b="0" i="0" u="none" strike="noStrike" baseline="0" dirty="0">
+                <a:solidFill>
+                  <a:srgbClr val="000000"/>
+                </a:solidFill>
+                <a:latin typeface="Courier New" panose="02070309020205020404" pitchFamily="49" charset="0"/>
+              </a:rPr>
+              <a:t> </a:t>
+            </a:r>
+            <a:r>
+              <a:rPr lang="en-US" sz="1800" b="1" i="0" u="none" strike="noStrike" baseline="0" dirty="0">
+                <a:solidFill>
+                  <a:srgbClr val="0000FF"/>
+                </a:solidFill>
+                <a:latin typeface="Courier New" panose="02070309020205020404" pitchFamily="49" charset="0"/>
+              </a:rPr>
+              <a:t>FROM</a:t>
+            </a:r>
+            <a:r>
+              <a:rPr lang="en-US" sz="1800" b="0" i="0" u="none" strike="noStrike" baseline="0" dirty="0">
+                <a:solidFill>
+                  <a:srgbClr val="000000"/>
+                </a:solidFill>
+                <a:latin typeface="Courier New" panose="02070309020205020404" pitchFamily="49" charset="0"/>
+              </a:rPr>
+              <a:t> </a:t>
+            </a:r>
+            <a:r>
+              <a:rPr lang="en-US" sz="1800" b="0" i="0" u="none" strike="noStrike" baseline="0" dirty="0">
+                <a:solidFill>
+                  <a:srgbClr val="808000"/>
+                </a:solidFill>
+                <a:latin typeface="Courier New" panose="02070309020205020404" pitchFamily="49" charset="0"/>
+              </a:rPr>
+              <a:t>`games`</a:t>
+            </a:r>
+          </a:p>
+          <a:p>
+            <a:r>
+              <a:rPr lang="en-US" sz="1800" b="1" i="0" u="none" strike="noStrike" baseline="0" dirty="0">
+                <a:solidFill>
+                  <a:srgbClr val="0000FF"/>
+                </a:solidFill>
+                <a:latin typeface="Courier New" panose="02070309020205020404" pitchFamily="49" charset="0"/>
+              </a:rPr>
+              <a:t>WHERE</a:t>
+            </a:r>
+            <a:r>
+              <a:rPr lang="en-US" sz="1800" b="0" i="0" u="none" strike="noStrike" baseline="0" dirty="0">
+                <a:solidFill>
+                  <a:srgbClr val="000000"/>
+                </a:solidFill>
+                <a:latin typeface="Courier New" panose="02070309020205020404" pitchFamily="49" charset="0"/>
+              </a:rPr>
+              <a:t> </a:t>
+            </a:r>
+            <a:r>
+              <a:rPr lang="en-US" sz="1800" b="0" i="0" u="none" strike="noStrike" baseline="0" dirty="0">
+                <a:solidFill>
+                  <a:srgbClr val="808000"/>
+                </a:solidFill>
+                <a:latin typeface="Courier New" panose="02070309020205020404" pitchFamily="49" charset="0"/>
+              </a:rPr>
+              <a:t>title</a:t>
+            </a:r>
+            <a:r>
+              <a:rPr lang="en-US" sz="1800" b="0" i="0" u="none" strike="noStrike" baseline="0" dirty="0">
+                <a:solidFill>
+                  <a:srgbClr val="000000"/>
+                </a:solidFill>
+                <a:latin typeface="Courier New" panose="02070309020205020404" pitchFamily="49" charset="0"/>
+              </a:rPr>
+              <a:t> </a:t>
+            </a:r>
+            <a:r>
+              <a:rPr lang="en-US" sz="1800" b="0" i="0" u="none" strike="noStrike" baseline="0" dirty="0">
+                <a:solidFill>
+                  <a:srgbClr val="0000FF"/>
+                </a:solidFill>
+                <a:latin typeface="Courier New" panose="02070309020205020404" pitchFamily="49" charset="0"/>
+              </a:rPr>
+              <a:t>=</a:t>
+            </a:r>
+            <a:r>
+              <a:rPr lang="en-US" sz="1800" b="0" i="0" u="none" strike="noStrike" baseline="0" dirty="0">
+                <a:solidFill>
+                  <a:srgbClr val="000000"/>
+                </a:solidFill>
+                <a:latin typeface="Courier New" panose="02070309020205020404" pitchFamily="49" charset="0"/>
+              </a:rPr>
+              <a:t> </a:t>
+            </a:r>
+            <a:r>
+              <a:rPr lang="en-US" sz="1800" b="0" i="0" u="none" strike="noStrike" baseline="0" dirty="0">
+                <a:solidFill>
+                  <a:srgbClr val="008000"/>
+                </a:solidFill>
+                <a:latin typeface="Courier New" panose="02070309020205020404" pitchFamily="49" charset="0"/>
+              </a:rPr>
+              <a:t>'Age of Empire II'</a:t>
+            </a:r>
           </a:p>
           <a:p>
             <a:endParaRPr lang="fr-BE" dirty="0"/>
@@ -8848,7 +9162,7 @@
     </p:spTree>
     <p:extLst>
       <p:ext uri="{BB962C8B-B14F-4D97-AF65-F5344CB8AC3E}">
-        <p14:creationId xmlns:p14="http://schemas.microsoft.com/office/powerpoint/2010/main" val="519460832"/>
+        <p14:creationId xmlns:p14="http://schemas.microsoft.com/office/powerpoint/2010/main" val="2218554563"/>
       </p:ext>
     </p:extLst>
   </p:cSld>
@@ -8880,7 +9194,7 @@
           <p:cNvPr id="2" name="Titre 1">
             <a:extLst>
               <a:ext uri="{FF2B5EF4-FFF2-40B4-BE49-F238E27FC236}">
-                <a16:creationId xmlns:a16="http://schemas.microsoft.com/office/drawing/2014/main" id="{25AE0EC8-8C4B-4854-6207-5950A432058B}"/>
+                <a16:creationId xmlns:a16="http://schemas.microsoft.com/office/drawing/2014/main" id="{5E4018D2-D4CC-5965-F487-963C3920C075}"/>
               </a:ext>
             </a:extLst>
           </p:cNvPr>
@@ -8898,7 +9212,7 @@
           <a:p>
             <a:r>
               <a:rPr lang="fr-FR" dirty="0"/>
-              <a:t>UPDATE exercices</a:t>
+              <a:t>Ajouter des conditions</a:t>
             </a:r>
             <a:endParaRPr lang="fr-BE" dirty="0"/>
           </a:p>
@@ -8909,7 +9223,7 @@
           <p:cNvPr id="3" name="Espace réservé du contenu 2">
             <a:extLst>
               <a:ext uri="{FF2B5EF4-FFF2-40B4-BE49-F238E27FC236}">
-                <a16:creationId xmlns:a16="http://schemas.microsoft.com/office/drawing/2014/main" id="{9AD83822-C1A3-CDDC-A909-7A62FAB85352}"/>
+                <a16:creationId xmlns:a16="http://schemas.microsoft.com/office/drawing/2014/main" id="{059A030F-CDAE-18A6-8156-EFE7F67E1BCC}"/>
               </a:ext>
             </a:extLst>
           </p:cNvPr>
@@ -8922,102 +9236,582 @@
         </p:nvSpPr>
         <p:spPr/>
         <p:txBody>
-          <a:bodyPr/>
+          <a:bodyPr>
+            <a:normAutofit fontScale="92500"/>
+          </a:bodyPr>
           <a:lstStyle/>
           <a:p>
             <a:r>
-              <a:rPr lang="fr-FR" dirty="0" err="1"/>
-              <a:t>Find</a:t>
-            </a:r>
-            <a:r>
               <a:rPr lang="fr-FR" dirty="0"/>
-              <a:t> a match </a:t>
-            </a:r>
-            <a:r>
-              <a:rPr lang="fr-FR" dirty="0" err="1"/>
-              <a:t>where</a:t>
-            </a:r>
+              <a:t>Il est possible de définir plus d’une condition à la clause WHERE avec les mots clés AND et OR</a:t>
+            </a:r>
+          </a:p>
+          <a:p>
             <a:r>
               <a:rPr lang="fr-FR" dirty="0"/>
-              <a:t> </a:t>
-            </a:r>
-            <a:r>
-              <a:rPr lang="fr-FR" dirty="0" err="1"/>
-              <a:t>end_date</a:t>
-            </a:r>
+              <a:t>Syntaxe:</a:t>
+            </a:r>
+          </a:p>
+          <a:p>
+            <a:endParaRPr lang="fr-FR" dirty="0"/>
+          </a:p>
+          <a:p>
+            <a:endParaRPr lang="fr-FR" dirty="0"/>
+          </a:p>
+          <a:p>
             <a:r>
               <a:rPr lang="fr-FR" dirty="0"/>
-              <a:t> </a:t>
-            </a:r>
-            <a:r>
-              <a:rPr lang="fr-FR" dirty="0" err="1"/>
-              <a:t>is</a:t>
-            </a:r>
+              <a:t>Exemple:</a:t>
+            </a:r>
+          </a:p>
+          <a:p>
+            <a:endParaRPr lang="fr-FR" dirty="0"/>
+          </a:p>
+          <a:p>
+            <a:endParaRPr lang="fr-FR" dirty="0"/>
+          </a:p>
+          <a:p>
             <a:r>
               <a:rPr lang="fr-FR" dirty="0"/>
-              <a:t> </a:t>
-            </a:r>
-            <a:r>
-              <a:rPr lang="fr-FR" dirty="0" err="1"/>
-              <a:t>before</a:t>
+              <a:t>Lire la suite sur: </a:t>
+            </a:r>
+            <a:r>
+              <a:rPr lang="fr-FR" dirty="0">
+                <a:hlinkClick r:id="rId2"/>
+              </a:rPr>
+              <a:t>https://www.w3schools.com/mysql/mysql_and_or.asp</a:t>
             </a:r>
             <a:r>
               <a:rPr lang="fr-FR" dirty="0"/>
               <a:t> </a:t>
             </a:r>
-            <a:r>
-              <a:rPr lang="fr-FR" dirty="0" err="1"/>
-              <a:t>start_date</a:t>
-            </a:r>
-            <a:r>
-              <a:rPr lang="fr-FR" dirty="0"/>
-              <a:t> and correct </a:t>
-            </a:r>
-            <a:r>
-              <a:rPr lang="fr-FR" dirty="0" err="1"/>
-              <a:t>it</a:t>
-            </a:r>
-            <a:r>
-              <a:rPr lang="fr-FR" dirty="0"/>
-              <a:t>.</a:t>
-            </a:r>
-          </a:p>
-          <a:p>
-            <a:r>
-              <a:rPr lang="fr-FR" dirty="0"/>
-              <a:t>The ‘</a:t>
-            </a:r>
-            <a:r>
-              <a:rPr lang="fr-FR" dirty="0" err="1"/>
-              <a:t>red</a:t>
-            </a:r>
-            <a:r>
-              <a:rPr lang="fr-FR" dirty="0"/>
-              <a:t>’ team </a:t>
-            </a:r>
-            <a:r>
-              <a:rPr lang="fr-FR" dirty="0" err="1"/>
-              <a:t>is</a:t>
-            </a:r>
-            <a:r>
-              <a:rPr lang="fr-FR" dirty="0"/>
-              <a:t> </a:t>
-            </a:r>
-            <a:r>
-              <a:rPr lang="fr-FR" dirty="0" err="1"/>
-              <a:t>now</a:t>
-            </a:r>
-            <a:r>
-              <a:rPr lang="fr-FR" dirty="0"/>
-              <a:t> the ‘</a:t>
-            </a:r>
-            <a:r>
-              <a:rPr lang="fr-FR" dirty="0" err="1"/>
-              <a:t>pink</a:t>
-            </a:r>
-            <a:r>
-              <a:rPr lang="fr-FR" dirty="0"/>
-              <a:t>’ team</a:t>
+          </a:p>
+          <a:p>
+            <a:endParaRPr lang="fr-FR" dirty="0"/>
+          </a:p>
+          <a:p>
+            <a:endParaRPr lang="fr-BE" dirty="0"/>
+          </a:p>
+        </p:txBody>
+      </p:sp>
+      <p:sp>
+        <p:nvSpPr>
+          <p:cNvPr id="4" name="ZoneTexte 3">
+            <a:extLst>
+              <a:ext uri="{FF2B5EF4-FFF2-40B4-BE49-F238E27FC236}">
+                <a16:creationId xmlns:a16="http://schemas.microsoft.com/office/drawing/2014/main" id="{E954EABB-7E7D-8F80-A71A-CF306760665F}"/>
+              </a:ext>
+            </a:extLst>
+          </p:cNvPr>
+          <p:cNvSpPr txBox="1"/>
+          <p:nvPr/>
+        </p:nvSpPr>
+        <p:spPr>
+          <a:xfrm>
+            <a:off x="1047565" y="3158837"/>
+            <a:ext cx="5823752" cy="923330"/>
+          </a:xfrm>
+          <a:prstGeom prst="rect">
+            <a:avLst/>
+          </a:prstGeom>
+          <a:noFill/>
+        </p:spPr>
+        <p:txBody>
+          <a:bodyPr wrap="square" rtlCol="0">
+            <a:spAutoFit/>
+          </a:bodyPr>
+          <a:lstStyle/>
+          <a:p>
+            <a:r>
+              <a:rPr lang="en-US" dirty="0">
+                <a:solidFill>
+                  <a:srgbClr val="0000CD"/>
+                </a:solidFill>
+                <a:effectLst/>
+              </a:rPr>
+              <a:t>SELECT</a:t>
+            </a:r>
+            <a:r>
+              <a:rPr lang="en-US" dirty="0">
+                <a:solidFill>
+                  <a:srgbClr val="000000"/>
+                </a:solidFill>
+                <a:effectLst/>
+              </a:rPr>
+              <a:t> </a:t>
+            </a:r>
+            <a:r>
+              <a:rPr lang="en-US" i="1" dirty="0">
+                <a:solidFill>
+                  <a:srgbClr val="000000"/>
+                </a:solidFill>
+                <a:effectLst/>
+              </a:rPr>
+              <a:t>column1</a:t>
+            </a:r>
+            <a:r>
+              <a:rPr lang="en-US" dirty="0">
+                <a:solidFill>
+                  <a:srgbClr val="000000"/>
+                </a:solidFill>
+                <a:effectLst/>
+              </a:rPr>
+              <a:t>,</a:t>
+            </a:r>
+            <a:r>
+              <a:rPr lang="en-US" i="1" dirty="0">
+                <a:solidFill>
+                  <a:srgbClr val="000000"/>
+                </a:solidFill>
+                <a:effectLst/>
+              </a:rPr>
+              <a:t> column2, ...</a:t>
+            </a:r>
+            <a:br>
+              <a:rPr lang="en-US" dirty="0">
+                <a:solidFill>
+                  <a:srgbClr val="000000"/>
+                </a:solidFill>
+                <a:effectLst/>
+              </a:rPr>
+            </a:br>
+            <a:r>
+              <a:rPr lang="en-US" dirty="0">
+                <a:solidFill>
+                  <a:srgbClr val="0000CD"/>
+                </a:solidFill>
+                <a:effectLst/>
+              </a:rPr>
+              <a:t>FROM</a:t>
+            </a:r>
+            <a:r>
+              <a:rPr lang="en-US" dirty="0">
+                <a:solidFill>
+                  <a:srgbClr val="000000"/>
+                </a:solidFill>
+                <a:effectLst/>
+              </a:rPr>
+              <a:t> </a:t>
+            </a:r>
+            <a:r>
+              <a:rPr lang="en-US" i="1" dirty="0" err="1">
+                <a:solidFill>
+                  <a:srgbClr val="000000"/>
+                </a:solidFill>
+                <a:effectLst/>
+              </a:rPr>
+              <a:t>table_name</a:t>
+            </a:r>
+            <a:br>
+              <a:rPr lang="en-US" dirty="0">
+                <a:solidFill>
+                  <a:srgbClr val="000000"/>
+                </a:solidFill>
+                <a:effectLst/>
+              </a:rPr>
+            </a:br>
+            <a:r>
+              <a:rPr lang="en-US" dirty="0">
+                <a:solidFill>
+                  <a:srgbClr val="0000CD"/>
+                </a:solidFill>
+                <a:effectLst/>
+              </a:rPr>
+              <a:t>WHERE</a:t>
+            </a:r>
+            <a:r>
+              <a:rPr lang="en-US" dirty="0">
+                <a:solidFill>
+                  <a:srgbClr val="000000"/>
+                </a:solidFill>
+                <a:effectLst/>
+              </a:rPr>
+              <a:t> </a:t>
+            </a:r>
+            <a:r>
+              <a:rPr lang="en-US" i="1" dirty="0">
+                <a:solidFill>
+                  <a:srgbClr val="000000"/>
+                </a:solidFill>
+                <a:effectLst/>
+              </a:rPr>
+              <a:t>condition1</a:t>
+            </a:r>
+            <a:r>
+              <a:rPr lang="en-US" dirty="0">
+                <a:solidFill>
+                  <a:srgbClr val="000000"/>
+                </a:solidFill>
+                <a:effectLst/>
+              </a:rPr>
+              <a:t> </a:t>
+            </a:r>
+            <a:r>
+              <a:rPr lang="en-US" dirty="0">
+                <a:solidFill>
+                  <a:srgbClr val="0000CD"/>
+                </a:solidFill>
+                <a:effectLst/>
+              </a:rPr>
+              <a:t>AND</a:t>
+            </a:r>
+            <a:r>
+              <a:rPr lang="en-US" dirty="0">
+                <a:solidFill>
+                  <a:srgbClr val="000000"/>
+                </a:solidFill>
+                <a:effectLst/>
+              </a:rPr>
+              <a:t> </a:t>
+            </a:r>
+            <a:r>
+              <a:rPr lang="en-US" i="1" dirty="0">
+                <a:solidFill>
+                  <a:srgbClr val="000000"/>
+                </a:solidFill>
+                <a:effectLst/>
+              </a:rPr>
+              <a:t>condition2</a:t>
+            </a:r>
+            <a:r>
+              <a:rPr lang="en-US" dirty="0">
+                <a:solidFill>
+                  <a:srgbClr val="000000"/>
+                </a:solidFill>
+                <a:effectLst/>
+              </a:rPr>
+              <a:t> </a:t>
+            </a:r>
+            <a:r>
+              <a:rPr lang="en-US" dirty="0">
+                <a:solidFill>
+                  <a:srgbClr val="0000CD"/>
+                </a:solidFill>
+                <a:effectLst/>
+              </a:rPr>
+              <a:t>AND</a:t>
+            </a:r>
+            <a:r>
+              <a:rPr lang="en-US" dirty="0">
+                <a:solidFill>
+                  <a:srgbClr val="000000"/>
+                </a:solidFill>
+                <a:effectLst/>
+              </a:rPr>
+              <a:t> </a:t>
+            </a:r>
+            <a:r>
+              <a:rPr lang="en-US" i="1" dirty="0">
+                <a:solidFill>
+                  <a:srgbClr val="000000"/>
+                </a:solidFill>
+                <a:effectLst/>
+              </a:rPr>
+              <a:t>condition3 ...</a:t>
+            </a:r>
+            <a:r>
+              <a:rPr lang="en-US" dirty="0">
+                <a:solidFill>
+                  <a:srgbClr val="000000"/>
+                </a:solidFill>
+                <a:effectLst/>
+              </a:rPr>
+              <a:t>; </a:t>
+            </a:r>
+            <a:endParaRPr lang="fr-BE" dirty="0"/>
+          </a:p>
+        </p:txBody>
+      </p:sp>
+      <p:sp>
+        <p:nvSpPr>
+          <p:cNvPr id="6" name="ZoneTexte 5">
+            <a:extLst>
+              <a:ext uri="{FF2B5EF4-FFF2-40B4-BE49-F238E27FC236}">
+                <a16:creationId xmlns:a16="http://schemas.microsoft.com/office/drawing/2014/main" id="{09D711FD-AC18-7676-A45C-5A5D80166308}"/>
+              </a:ext>
+            </a:extLst>
+          </p:cNvPr>
+          <p:cNvSpPr txBox="1"/>
+          <p:nvPr/>
+        </p:nvSpPr>
+        <p:spPr>
+          <a:xfrm>
+            <a:off x="841788" y="4757588"/>
+            <a:ext cx="7865614" cy="923330"/>
+          </a:xfrm>
+          <a:prstGeom prst="rect">
+            <a:avLst/>
+          </a:prstGeom>
+          <a:noFill/>
+        </p:spPr>
+        <p:txBody>
+          <a:bodyPr wrap="square" rtlCol="0">
+            <a:spAutoFit/>
+          </a:bodyPr>
+          <a:lstStyle/>
+          <a:p>
+            <a:r>
+              <a:rPr lang="en-US" sz="1800" b="1" i="0" u="none" strike="noStrike" baseline="0" dirty="0">
+                <a:solidFill>
+                  <a:srgbClr val="0000FF"/>
+                </a:solidFill>
+                <a:latin typeface="Courier New" panose="02070309020205020404" pitchFamily="49" charset="0"/>
+              </a:rPr>
+              <a:t>SELECT</a:t>
+            </a:r>
+            <a:r>
+              <a:rPr lang="en-US" sz="1800" b="0" i="0" u="none" strike="noStrike" baseline="0" dirty="0">
+                <a:solidFill>
+                  <a:srgbClr val="000000"/>
+                </a:solidFill>
+                <a:latin typeface="Courier New" panose="02070309020205020404" pitchFamily="49" charset="0"/>
+              </a:rPr>
+              <a:t> </a:t>
+            </a:r>
+            <a:r>
+              <a:rPr lang="en-US" sz="1800" b="0" i="0" u="none" strike="noStrike" baseline="0" dirty="0">
+                <a:solidFill>
+                  <a:srgbClr val="808000"/>
+                </a:solidFill>
+                <a:latin typeface="Courier New" panose="02070309020205020404" pitchFamily="49" charset="0"/>
+              </a:rPr>
+              <a:t>`id`</a:t>
+            </a:r>
+            <a:r>
+              <a:rPr lang="en-US" sz="1800" b="0" i="0" u="none" strike="noStrike" baseline="0" dirty="0">
+                <a:solidFill>
+                  <a:srgbClr val="0000FF"/>
+                </a:solidFill>
+                <a:latin typeface="Courier New" panose="02070309020205020404" pitchFamily="49" charset="0"/>
+              </a:rPr>
+              <a:t>,</a:t>
+            </a:r>
+            <a:r>
+              <a:rPr lang="en-US" sz="1800" b="0" i="0" u="none" strike="noStrike" baseline="0" dirty="0">
+                <a:solidFill>
+                  <a:srgbClr val="000000"/>
+                </a:solidFill>
+                <a:latin typeface="Courier New" panose="02070309020205020404" pitchFamily="49" charset="0"/>
+              </a:rPr>
+              <a:t> </a:t>
+            </a:r>
+            <a:r>
+              <a:rPr lang="en-US" sz="1800" b="0" i="0" u="none" strike="noStrike" baseline="0" dirty="0">
+                <a:solidFill>
+                  <a:srgbClr val="808000"/>
+                </a:solidFill>
+                <a:latin typeface="Courier New" panose="02070309020205020404" pitchFamily="49" charset="0"/>
+              </a:rPr>
+              <a:t>`title`</a:t>
+            </a:r>
+            <a:r>
+              <a:rPr lang="en-US" sz="1800" b="0" i="0" u="none" strike="noStrike" baseline="0" dirty="0">
+                <a:solidFill>
+                  <a:srgbClr val="0000FF"/>
+                </a:solidFill>
+                <a:latin typeface="Courier New" panose="02070309020205020404" pitchFamily="49" charset="0"/>
+              </a:rPr>
+              <a:t>,</a:t>
+            </a:r>
+            <a:r>
+              <a:rPr lang="en-US" sz="1800" b="0" i="0" u="none" strike="noStrike" baseline="0" dirty="0">
+                <a:solidFill>
+                  <a:srgbClr val="000000"/>
+                </a:solidFill>
+                <a:latin typeface="Courier New" panose="02070309020205020404" pitchFamily="49" charset="0"/>
+              </a:rPr>
+              <a:t> </a:t>
+            </a:r>
+            <a:r>
+              <a:rPr lang="en-US" sz="1800" b="0" i="0" u="none" strike="noStrike" baseline="0" dirty="0">
+                <a:solidFill>
+                  <a:srgbClr val="808000"/>
+                </a:solidFill>
+                <a:latin typeface="Courier New" panose="02070309020205020404" pitchFamily="49" charset="0"/>
+              </a:rPr>
+              <a:t>`types`</a:t>
+            </a:r>
+            <a:r>
+              <a:rPr lang="en-US" sz="1800" b="0" i="0" u="none" strike="noStrike" baseline="0" dirty="0">
+                <a:solidFill>
+                  <a:srgbClr val="000000"/>
+                </a:solidFill>
+                <a:latin typeface="Courier New" panose="02070309020205020404" pitchFamily="49" charset="0"/>
+              </a:rPr>
+              <a:t> </a:t>
+            </a:r>
+            <a:r>
+              <a:rPr lang="en-US" sz="1800" b="1" i="0" u="none" strike="noStrike" baseline="0" dirty="0">
+                <a:solidFill>
+                  <a:srgbClr val="0000FF"/>
+                </a:solidFill>
+                <a:latin typeface="Courier New" panose="02070309020205020404" pitchFamily="49" charset="0"/>
+              </a:rPr>
+              <a:t>FROM</a:t>
+            </a:r>
+            <a:r>
+              <a:rPr lang="en-US" sz="1800" b="0" i="0" u="none" strike="noStrike" baseline="0" dirty="0">
+                <a:solidFill>
+                  <a:srgbClr val="000000"/>
+                </a:solidFill>
+                <a:latin typeface="Courier New" panose="02070309020205020404" pitchFamily="49" charset="0"/>
+              </a:rPr>
+              <a:t> </a:t>
+            </a:r>
+            <a:r>
+              <a:rPr lang="en-US" sz="1800" b="0" i="0" u="none" strike="noStrike" baseline="0" dirty="0">
+                <a:solidFill>
+                  <a:srgbClr val="808000"/>
+                </a:solidFill>
+                <a:latin typeface="Courier New" panose="02070309020205020404" pitchFamily="49" charset="0"/>
+              </a:rPr>
+              <a:t>`games`</a:t>
+            </a:r>
+          </a:p>
+          <a:p>
+            <a:r>
+              <a:rPr lang="en-US" sz="1800" b="1" i="0" u="none" strike="noStrike" baseline="0" dirty="0">
+                <a:solidFill>
+                  <a:srgbClr val="0000FF"/>
+                </a:solidFill>
+                <a:latin typeface="Courier New" panose="02070309020205020404" pitchFamily="49" charset="0"/>
+              </a:rPr>
+              <a:t>WHERE</a:t>
+            </a:r>
+            <a:r>
+              <a:rPr lang="en-US" sz="1800" b="0" i="0" u="none" strike="noStrike" baseline="0" dirty="0">
+                <a:solidFill>
+                  <a:srgbClr val="000000"/>
+                </a:solidFill>
+                <a:latin typeface="Courier New" panose="02070309020205020404" pitchFamily="49" charset="0"/>
+              </a:rPr>
+              <a:t> </a:t>
+            </a:r>
+            <a:r>
+              <a:rPr lang="en-US" sz="1800" b="0" i="0" u="none" strike="noStrike" baseline="0" dirty="0">
+                <a:solidFill>
+                  <a:srgbClr val="808000"/>
+                </a:solidFill>
+                <a:latin typeface="Courier New" panose="02070309020205020404" pitchFamily="49" charset="0"/>
+              </a:rPr>
+              <a:t>title</a:t>
+            </a:r>
+            <a:r>
+              <a:rPr lang="en-US" sz="1800" b="0" i="0" u="none" strike="noStrike" baseline="0" dirty="0">
+                <a:solidFill>
+                  <a:srgbClr val="000000"/>
+                </a:solidFill>
+                <a:latin typeface="Courier New" panose="02070309020205020404" pitchFamily="49" charset="0"/>
+              </a:rPr>
+              <a:t> </a:t>
+            </a:r>
+            <a:r>
+              <a:rPr lang="en-US" sz="1800" b="0" i="0" u="none" strike="noStrike" baseline="0" dirty="0">
+                <a:solidFill>
+                  <a:srgbClr val="0000FF"/>
+                </a:solidFill>
+                <a:latin typeface="Courier New" panose="02070309020205020404" pitchFamily="49" charset="0"/>
+              </a:rPr>
+              <a:t>=</a:t>
+            </a:r>
+            <a:r>
+              <a:rPr lang="en-US" sz="1800" b="0" i="0" u="none" strike="noStrike" baseline="0" dirty="0">
+                <a:solidFill>
+                  <a:srgbClr val="000000"/>
+                </a:solidFill>
+                <a:latin typeface="Courier New" panose="02070309020205020404" pitchFamily="49" charset="0"/>
+              </a:rPr>
+              <a:t> </a:t>
+            </a:r>
+            <a:r>
+              <a:rPr lang="en-US" sz="1800" b="0" i="0" u="none" strike="noStrike" baseline="0" dirty="0">
+                <a:solidFill>
+                  <a:srgbClr val="008000"/>
+                </a:solidFill>
+                <a:latin typeface="Courier New" panose="02070309020205020404" pitchFamily="49" charset="0"/>
+              </a:rPr>
+              <a:t>'Age of Empire II'</a:t>
+            </a:r>
+            <a:r>
+              <a:rPr lang="en-US" sz="1800" b="0" i="0" u="none" strike="noStrike" baseline="0" dirty="0">
+                <a:solidFill>
+                  <a:srgbClr val="000000"/>
+                </a:solidFill>
+                <a:latin typeface="Courier New" panose="02070309020205020404" pitchFamily="49" charset="0"/>
+              </a:rPr>
+              <a:t> </a:t>
+            </a:r>
+            <a:r>
+              <a:rPr lang="en-US" sz="1800" b="1" i="0" u="none" strike="noStrike" baseline="0" dirty="0">
+                <a:solidFill>
+                  <a:srgbClr val="0000FF"/>
+                </a:solidFill>
+                <a:latin typeface="Courier New" panose="02070309020205020404" pitchFamily="49" charset="0"/>
+              </a:rPr>
+              <a:t>OR</a:t>
+            </a:r>
+            <a:r>
+              <a:rPr lang="en-US" sz="1800" b="0" i="0" u="none" strike="noStrike" baseline="0" dirty="0">
+                <a:solidFill>
+                  <a:srgbClr val="000000"/>
+                </a:solidFill>
+                <a:latin typeface="Courier New" panose="02070309020205020404" pitchFamily="49" charset="0"/>
+              </a:rPr>
+              <a:t> </a:t>
+            </a:r>
+            <a:r>
+              <a:rPr lang="en-US" sz="1800" b="0" i="0" u="none" strike="noStrike" baseline="0" dirty="0">
+                <a:solidFill>
+                  <a:srgbClr val="808000"/>
+                </a:solidFill>
+                <a:latin typeface="Courier New" panose="02070309020205020404" pitchFamily="49" charset="0"/>
+              </a:rPr>
+              <a:t>title</a:t>
+            </a:r>
+            <a:r>
+              <a:rPr lang="en-US" sz="1800" b="0" i="0" u="none" strike="noStrike" baseline="0" dirty="0">
+                <a:solidFill>
+                  <a:srgbClr val="000000"/>
+                </a:solidFill>
+                <a:latin typeface="Courier New" panose="02070309020205020404" pitchFamily="49" charset="0"/>
+              </a:rPr>
+              <a:t> </a:t>
+            </a:r>
+            <a:r>
+              <a:rPr lang="en-US" sz="1800" b="0" i="0" u="none" strike="noStrike" baseline="0" dirty="0">
+                <a:solidFill>
+                  <a:srgbClr val="0000FF"/>
+                </a:solidFill>
+                <a:latin typeface="Courier New" panose="02070309020205020404" pitchFamily="49" charset="0"/>
+              </a:rPr>
+              <a:t>=</a:t>
+            </a:r>
+            <a:r>
+              <a:rPr lang="en-US" sz="1800" b="0" i="0" u="none" strike="noStrike" baseline="0" dirty="0">
+                <a:solidFill>
+                  <a:srgbClr val="000000"/>
+                </a:solidFill>
+                <a:latin typeface="Courier New" panose="02070309020205020404" pitchFamily="49" charset="0"/>
+              </a:rPr>
+              <a:t> </a:t>
+            </a:r>
+            <a:r>
+              <a:rPr lang="en-US" sz="1800" b="0" i="0" u="none" strike="noStrike" baseline="0" dirty="0">
+                <a:solidFill>
+                  <a:srgbClr val="008000"/>
+                </a:solidFill>
+                <a:latin typeface="Courier New" panose="02070309020205020404" pitchFamily="49" charset="0"/>
+              </a:rPr>
+              <a:t>'AOE2'</a:t>
+            </a:r>
+            <a:r>
+              <a:rPr lang="en-US" sz="1800" b="0" i="0" u="none" strike="noStrike" baseline="0" dirty="0">
+                <a:solidFill>
+                  <a:srgbClr val="0000FF"/>
+                </a:solidFill>
+                <a:latin typeface="Courier New" panose="02070309020205020404" pitchFamily="49" charset="0"/>
+              </a:rPr>
+              <a:t>;</a:t>
             </a:r>
           </a:p>
           <a:p>
@@ -9028,7 +9822,584 @@
     </p:spTree>
     <p:extLst>
       <p:ext uri="{BB962C8B-B14F-4D97-AF65-F5344CB8AC3E}">
-        <p14:creationId xmlns:p14="http://schemas.microsoft.com/office/powerpoint/2010/main" val="2612689474"/>
+        <p14:creationId xmlns:p14="http://schemas.microsoft.com/office/powerpoint/2010/main" val="3496392870"/>
+      </p:ext>
+    </p:extLst>
+  </p:cSld>
+  <p:clrMapOvr>
+    <a:masterClrMapping/>
+  </p:clrMapOvr>
+</p:sld>
+</file>
+
+<file path=ppt/slides/slide19.xml><?xml version="1.0" encoding="utf-8"?>
+<p:sld xmlns:a="http://schemas.openxmlformats.org/drawingml/2006/main" xmlns:r="http://schemas.openxmlformats.org/officeDocument/2006/relationships" xmlns:p="http://schemas.openxmlformats.org/presentationml/2006/main">
+  <p:cSld>
+    <p:spTree>
+      <p:nvGrpSpPr>
+        <p:cNvPr id="1" name=""/>
+        <p:cNvGrpSpPr/>
+        <p:nvPr/>
+      </p:nvGrpSpPr>
+      <p:grpSpPr>
+        <a:xfrm>
+          <a:off x="0" y="0"/>
+          <a:ext cx="0" cy="0"/>
+          <a:chOff x="0" y="0"/>
+          <a:chExt cx="0" cy="0"/>
+        </a:xfrm>
+      </p:grpSpPr>
+      <p:sp>
+        <p:nvSpPr>
+          <p:cNvPr id="2" name="Titre 1">
+            <a:extLst>
+              <a:ext uri="{FF2B5EF4-FFF2-40B4-BE49-F238E27FC236}">
+                <a16:creationId xmlns:a16="http://schemas.microsoft.com/office/drawing/2014/main" id="{A8A2B3DB-7FFB-F3C6-6E37-15032332AC83}"/>
+              </a:ext>
+            </a:extLst>
+          </p:cNvPr>
+          <p:cNvSpPr>
+            <a:spLocks noGrp="1"/>
+          </p:cNvSpPr>
+          <p:nvPr>
+            <p:ph type="title"/>
+          </p:nvPr>
+        </p:nvSpPr>
+        <p:spPr/>
+        <p:txBody>
+          <a:bodyPr/>
+          <a:lstStyle/>
+          <a:p>
+            <a:r>
+              <a:rPr lang="fr-FR" dirty="0"/>
+              <a:t>ORDER BY</a:t>
+            </a:r>
+            <a:endParaRPr lang="fr-BE" dirty="0"/>
+          </a:p>
+        </p:txBody>
+      </p:sp>
+      <p:sp>
+        <p:nvSpPr>
+          <p:cNvPr id="3" name="Espace réservé du contenu 2">
+            <a:extLst>
+              <a:ext uri="{FF2B5EF4-FFF2-40B4-BE49-F238E27FC236}">
+                <a16:creationId xmlns:a16="http://schemas.microsoft.com/office/drawing/2014/main" id="{F1016447-E082-E9C6-4354-041830CD0851}"/>
+              </a:ext>
+            </a:extLst>
+          </p:cNvPr>
+          <p:cNvSpPr>
+            <a:spLocks noGrp="1"/>
+          </p:cNvSpPr>
+          <p:nvPr>
+            <p:ph idx="1"/>
+          </p:nvPr>
+        </p:nvSpPr>
+        <p:spPr/>
+        <p:txBody>
+          <a:bodyPr/>
+          <a:lstStyle/>
+          <a:p>
+            <a:r>
+              <a:rPr lang="fr-FR" dirty="0"/>
+              <a:t>Permet de trier les résultats</a:t>
+            </a:r>
+          </a:p>
+          <a:p>
+            <a:r>
+              <a:rPr lang="fr-FR" dirty="0"/>
+              <a:t>Syntaxe:</a:t>
+            </a:r>
+          </a:p>
+          <a:p>
+            <a:endParaRPr lang="fr-FR" dirty="0"/>
+          </a:p>
+          <a:p>
+            <a:endParaRPr lang="fr-FR" dirty="0"/>
+          </a:p>
+          <a:p>
+            <a:r>
+              <a:rPr lang="fr-FR" dirty="0"/>
+              <a:t>Exemple:</a:t>
+            </a:r>
+          </a:p>
+          <a:p>
+            <a:endParaRPr lang="fr-FR" dirty="0"/>
+          </a:p>
+          <a:p>
+            <a:endParaRPr lang="fr-FR" dirty="0"/>
+          </a:p>
+          <a:p>
+            <a:r>
+              <a:rPr lang="fr-FR" dirty="0"/>
+              <a:t>Plus d’infos: </a:t>
+            </a:r>
+            <a:r>
+              <a:rPr lang="fr-FR" dirty="0">
+                <a:hlinkClick r:id="rId2"/>
+              </a:rPr>
+              <a:t>https://www.w3schools.com/mysql/mysql_orderby.asp</a:t>
+            </a:r>
+            <a:r>
+              <a:rPr lang="fr-FR" dirty="0"/>
+              <a:t> </a:t>
+            </a:r>
+          </a:p>
+          <a:p>
+            <a:endParaRPr lang="fr-FR" dirty="0"/>
+          </a:p>
+          <a:p>
+            <a:endParaRPr lang="fr-BE" dirty="0"/>
+          </a:p>
+        </p:txBody>
+      </p:sp>
+      <p:sp>
+        <p:nvSpPr>
+          <p:cNvPr id="4" name="ZoneTexte 3">
+            <a:extLst>
+              <a:ext uri="{FF2B5EF4-FFF2-40B4-BE49-F238E27FC236}">
+                <a16:creationId xmlns:a16="http://schemas.microsoft.com/office/drawing/2014/main" id="{2E575ECE-E02E-A7FF-148E-DA5BF241810F}"/>
+              </a:ext>
+            </a:extLst>
+          </p:cNvPr>
+          <p:cNvSpPr txBox="1"/>
+          <p:nvPr/>
+        </p:nvSpPr>
+        <p:spPr>
+          <a:xfrm>
+            <a:off x="838200" y="2805344"/>
+            <a:ext cx="5211193" cy="923330"/>
+          </a:xfrm>
+          <a:prstGeom prst="rect">
+            <a:avLst/>
+          </a:prstGeom>
+          <a:noFill/>
+        </p:spPr>
+        <p:txBody>
+          <a:bodyPr wrap="square" rtlCol="0">
+            <a:spAutoFit/>
+          </a:bodyPr>
+          <a:lstStyle/>
+          <a:p>
+            <a:r>
+              <a:rPr lang="en-US" dirty="0">
+                <a:solidFill>
+                  <a:srgbClr val="0000CD"/>
+                </a:solidFill>
+                <a:effectLst/>
+              </a:rPr>
+              <a:t>SELECT</a:t>
+            </a:r>
+            <a:r>
+              <a:rPr lang="en-US" dirty="0">
+                <a:solidFill>
+                  <a:srgbClr val="000000"/>
+                </a:solidFill>
+                <a:effectLst/>
+              </a:rPr>
+              <a:t> </a:t>
+            </a:r>
+            <a:r>
+              <a:rPr lang="en-US" i="1" dirty="0">
+                <a:solidFill>
+                  <a:srgbClr val="000000"/>
+                </a:solidFill>
+                <a:effectLst/>
+              </a:rPr>
+              <a:t>column1</a:t>
+            </a:r>
+            <a:r>
+              <a:rPr lang="en-US" dirty="0">
+                <a:solidFill>
+                  <a:srgbClr val="000000"/>
+                </a:solidFill>
+                <a:effectLst/>
+              </a:rPr>
+              <a:t>,</a:t>
+            </a:r>
+            <a:r>
+              <a:rPr lang="en-US" i="1" dirty="0">
+                <a:solidFill>
+                  <a:srgbClr val="000000"/>
+                </a:solidFill>
+                <a:effectLst/>
+              </a:rPr>
+              <a:t> column2, ...</a:t>
+            </a:r>
+            <a:br>
+              <a:rPr lang="en-US" dirty="0">
+                <a:solidFill>
+                  <a:srgbClr val="000000"/>
+                </a:solidFill>
+                <a:effectLst/>
+              </a:rPr>
+            </a:br>
+            <a:r>
+              <a:rPr lang="en-US" dirty="0">
+                <a:solidFill>
+                  <a:srgbClr val="0000CD"/>
+                </a:solidFill>
+                <a:effectLst/>
+              </a:rPr>
+              <a:t>FROM</a:t>
+            </a:r>
+            <a:r>
+              <a:rPr lang="en-US" dirty="0">
+                <a:solidFill>
+                  <a:srgbClr val="000000"/>
+                </a:solidFill>
+                <a:effectLst/>
+              </a:rPr>
+              <a:t> </a:t>
+            </a:r>
+            <a:r>
+              <a:rPr lang="en-US" i="1" dirty="0" err="1">
+                <a:solidFill>
+                  <a:srgbClr val="000000"/>
+                </a:solidFill>
+                <a:effectLst/>
+              </a:rPr>
+              <a:t>table_name</a:t>
+            </a:r>
+            <a:br>
+              <a:rPr lang="en-US" dirty="0">
+                <a:solidFill>
+                  <a:srgbClr val="000000"/>
+                </a:solidFill>
+                <a:effectLst/>
+              </a:rPr>
+            </a:br>
+            <a:r>
+              <a:rPr lang="en-US" dirty="0">
+                <a:solidFill>
+                  <a:srgbClr val="0000CD"/>
+                </a:solidFill>
+                <a:effectLst/>
+              </a:rPr>
+              <a:t>ORDER</a:t>
+            </a:r>
+            <a:r>
+              <a:rPr lang="en-US" dirty="0">
+                <a:solidFill>
+                  <a:srgbClr val="000000"/>
+                </a:solidFill>
+                <a:effectLst/>
+              </a:rPr>
+              <a:t> </a:t>
+            </a:r>
+            <a:r>
+              <a:rPr lang="en-US" dirty="0">
+                <a:solidFill>
+                  <a:srgbClr val="0000CD"/>
+                </a:solidFill>
+                <a:effectLst/>
+              </a:rPr>
+              <a:t>BY</a:t>
+            </a:r>
+            <a:r>
+              <a:rPr lang="en-US" dirty="0">
+                <a:solidFill>
+                  <a:srgbClr val="000000"/>
+                </a:solidFill>
+                <a:effectLst/>
+              </a:rPr>
+              <a:t> </a:t>
+            </a:r>
+            <a:r>
+              <a:rPr lang="en-US" i="1" dirty="0">
+                <a:solidFill>
+                  <a:srgbClr val="000000"/>
+                </a:solidFill>
+                <a:effectLst/>
+              </a:rPr>
+              <a:t>column1, column2, ... </a:t>
+            </a:r>
+            <a:r>
+              <a:rPr lang="en-US" dirty="0">
+                <a:solidFill>
+                  <a:srgbClr val="0000CD"/>
+                </a:solidFill>
+                <a:effectLst/>
+              </a:rPr>
+              <a:t>ASC</a:t>
+            </a:r>
+            <a:r>
+              <a:rPr lang="en-US" dirty="0">
+                <a:solidFill>
+                  <a:srgbClr val="000000"/>
+                </a:solidFill>
+                <a:effectLst/>
+              </a:rPr>
+              <a:t>|</a:t>
+            </a:r>
+            <a:r>
+              <a:rPr lang="en-US" dirty="0">
+                <a:solidFill>
+                  <a:srgbClr val="0000CD"/>
+                </a:solidFill>
+                <a:effectLst/>
+              </a:rPr>
+              <a:t>DESC</a:t>
+            </a:r>
+            <a:r>
+              <a:rPr lang="en-US" dirty="0">
+                <a:solidFill>
+                  <a:srgbClr val="000000"/>
+                </a:solidFill>
+                <a:effectLst/>
+              </a:rPr>
+              <a:t>; </a:t>
+            </a:r>
+            <a:endParaRPr lang="fr-BE" dirty="0"/>
+          </a:p>
+        </p:txBody>
+      </p:sp>
+      <p:sp>
+        <p:nvSpPr>
+          <p:cNvPr id="6" name="ZoneTexte 5">
+            <a:extLst>
+              <a:ext uri="{FF2B5EF4-FFF2-40B4-BE49-F238E27FC236}">
+                <a16:creationId xmlns:a16="http://schemas.microsoft.com/office/drawing/2014/main" id="{C6EB2C07-DA01-D5B5-20C8-BFB5E5D4A1D2}"/>
+              </a:ext>
+            </a:extLst>
+          </p:cNvPr>
+          <p:cNvSpPr txBox="1"/>
+          <p:nvPr/>
+        </p:nvSpPr>
+        <p:spPr>
+          <a:xfrm>
+            <a:off x="838200" y="4491153"/>
+            <a:ext cx="6196614" cy="923330"/>
+          </a:xfrm>
+          <a:prstGeom prst="rect">
+            <a:avLst/>
+          </a:prstGeom>
+          <a:noFill/>
+        </p:spPr>
+        <p:txBody>
+          <a:bodyPr wrap="square" rtlCol="0">
+            <a:spAutoFit/>
+          </a:bodyPr>
+          <a:lstStyle/>
+          <a:p>
+            <a:r>
+              <a:rPr lang="en-US" sz="1800" b="1" i="0" u="none" strike="noStrike" baseline="0" dirty="0">
+                <a:solidFill>
+                  <a:srgbClr val="0000FF"/>
+                </a:solidFill>
+                <a:latin typeface="Courier New" panose="02070309020205020404" pitchFamily="49" charset="0"/>
+              </a:rPr>
+              <a:t>SELECT</a:t>
+            </a:r>
+            <a:r>
+              <a:rPr lang="en-US" sz="1800" b="0" i="0" u="none" strike="noStrike" baseline="0" dirty="0">
+                <a:solidFill>
+                  <a:srgbClr val="000000"/>
+                </a:solidFill>
+                <a:latin typeface="Courier New" panose="02070309020205020404" pitchFamily="49" charset="0"/>
+              </a:rPr>
+              <a:t> </a:t>
+            </a:r>
+            <a:r>
+              <a:rPr lang="en-US" sz="1800" b="0" i="0" u="none" strike="noStrike" baseline="0" dirty="0">
+                <a:solidFill>
+                  <a:srgbClr val="808000"/>
+                </a:solidFill>
+                <a:latin typeface="Courier New" panose="02070309020205020404" pitchFamily="49" charset="0"/>
+              </a:rPr>
+              <a:t>`id`</a:t>
+            </a:r>
+            <a:r>
+              <a:rPr lang="en-US" sz="1800" b="0" i="0" u="none" strike="noStrike" baseline="0" dirty="0">
+                <a:solidFill>
+                  <a:srgbClr val="0000FF"/>
+                </a:solidFill>
+                <a:latin typeface="Courier New" panose="02070309020205020404" pitchFamily="49" charset="0"/>
+              </a:rPr>
+              <a:t>,</a:t>
+            </a:r>
+            <a:r>
+              <a:rPr lang="en-US" sz="1800" b="0" i="0" u="none" strike="noStrike" baseline="0" dirty="0">
+                <a:solidFill>
+                  <a:srgbClr val="000000"/>
+                </a:solidFill>
+                <a:latin typeface="Courier New" panose="02070309020205020404" pitchFamily="49" charset="0"/>
+              </a:rPr>
+              <a:t> </a:t>
+            </a:r>
+            <a:r>
+              <a:rPr lang="en-US" sz="1800" b="0" i="0" u="none" strike="noStrike" baseline="0" dirty="0">
+                <a:solidFill>
+                  <a:srgbClr val="808000"/>
+                </a:solidFill>
+                <a:latin typeface="Courier New" panose="02070309020205020404" pitchFamily="49" charset="0"/>
+              </a:rPr>
+              <a:t>`title`</a:t>
+            </a:r>
+            <a:r>
+              <a:rPr lang="en-US" sz="1800" b="0" i="0" u="none" strike="noStrike" baseline="0" dirty="0">
+                <a:solidFill>
+                  <a:srgbClr val="0000FF"/>
+                </a:solidFill>
+                <a:latin typeface="Courier New" panose="02070309020205020404" pitchFamily="49" charset="0"/>
+              </a:rPr>
+              <a:t>,</a:t>
+            </a:r>
+            <a:r>
+              <a:rPr lang="en-US" sz="1800" b="0" i="0" u="none" strike="noStrike" baseline="0" dirty="0">
+                <a:solidFill>
+                  <a:srgbClr val="000000"/>
+                </a:solidFill>
+                <a:latin typeface="Courier New" panose="02070309020205020404" pitchFamily="49" charset="0"/>
+              </a:rPr>
+              <a:t> </a:t>
+            </a:r>
+            <a:r>
+              <a:rPr lang="en-US" sz="1800" b="0" i="0" u="none" strike="noStrike" baseline="0" dirty="0">
+                <a:solidFill>
+                  <a:srgbClr val="808000"/>
+                </a:solidFill>
+                <a:latin typeface="Courier New" panose="02070309020205020404" pitchFamily="49" charset="0"/>
+              </a:rPr>
+              <a:t>`types`</a:t>
+            </a:r>
+            <a:r>
+              <a:rPr lang="en-US" sz="1800" b="0" i="0" u="none" strike="noStrike" baseline="0" dirty="0">
+                <a:solidFill>
+                  <a:srgbClr val="000000"/>
+                </a:solidFill>
+                <a:latin typeface="Courier New" panose="02070309020205020404" pitchFamily="49" charset="0"/>
+              </a:rPr>
+              <a:t> </a:t>
+            </a:r>
+            <a:r>
+              <a:rPr lang="en-US" sz="1800" b="1" i="0" u="none" strike="noStrike" baseline="0" dirty="0">
+                <a:solidFill>
+                  <a:srgbClr val="0000FF"/>
+                </a:solidFill>
+                <a:latin typeface="Courier New" panose="02070309020205020404" pitchFamily="49" charset="0"/>
+              </a:rPr>
+              <a:t>FROM</a:t>
+            </a:r>
+            <a:r>
+              <a:rPr lang="en-US" sz="1800" b="0" i="0" u="none" strike="noStrike" baseline="0" dirty="0">
+                <a:solidFill>
+                  <a:srgbClr val="000000"/>
+                </a:solidFill>
+                <a:latin typeface="Courier New" panose="02070309020205020404" pitchFamily="49" charset="0"/>
+              </a:rPr>
+              <a:t> </a:t>
+            </a:r>
+            <a:r>
+              <a:rPr lang="en-US" sz="1800" b="0" i="0" u="none" strike="noStrike" baseline="0" dirty="0">
+                <a:solidFill>
+                  <a:srgbClr val="808000"/>
+                </a:solidFill>
+                <a:latin typeface="Courier New" panose="02070309020205020404" pitchFamily="49" charset="0"/>
+              </a:rPr>
+              <a:t>`games`</a:t>
+            </a:r>
+          </a:p>
+          <a:p>
+            <a:r>
+              <a:rPr lang="fr-BE" sz="1800" b="1" i="0" u="none" strike="noStrike" baseline="0" dirty="0">
+                <a:solidFill>
+                  <a:srgbClr val="0000FF"/>
+                </a:solidFill>
+                <a:latin typeface="Courier New" panose="02070309020205020404" pitchFamily="49" charset="0"/>
+              </a:rPr>
+              <a:t>ORDER</a:t>
+            </a:r>
+            <a:r>
+              <a:rPr lang="fr-BE" sz="1800" b="0" i="0" u="none" strike="noStrike" baseline="0" dirty="0">
+                <a:solidFill>
+                  <a:srgbClr val="000000"/>
+                </a:solidFill>
+                <a:latin typeface="Courier New" panose="02070309020205020404" pitchFamily="49" charset="0"/>
+              </a:rPr>
+              <a:t> </a:t>
+            </a:r>
+            <a:r>
+              <a:rPr lang="fr-BE" sz="1800" b="1" i="0" u="none" strike="noStrike" baseline="0" dirty="0">
+                <a:solidFill>
+                  <a:srgbClr val="0000FF"/>
+                </a:solidFill>
+                <a:latin typeface="Courier New" panose="02070309020205020404" pitchFamily="49" charset="0"/>
+              </a:rPr>
+              <a:t>BY</a:t>
+            </a:r>
+            <a:r>
+              <a:rPr lang="fr-BE" sz="1800" b="0" i="0" u="none" strike="noStrike" baseline="0" dirty="0">
+                <a:solidFill>
+                  <a:srgbClr val="000000"/>
+                </a:solidFill>
+                <a:latin typeface="Courier New" panose="02070309020205020404" pitchFamily="49" charset="0"/>
+              </a:rPr>
+              <a:t> </a:t>
+            </a:r>
+            <a:r>
+              <a:rPr lang="fr-BE" sz="1800" b="0" i="0" u="none" strike="noStrike" baseline="0" dirty="0">
+                <a:solidFill>
+                  <a:srgbClr val="808000"/>
+                </a:solidFill>
+                <a:latin typeface="Courier New" panose="02070309020205020404" pitchFamily="49" charset="0"/>
+              </a:rPr>
+              <a:t>`</a:t>
+            </a:r>
+            <a:r>
+              <a:rPr lang="fr-BE" sz="1800" b="0" i="0" u="none" strike="noStrike" baseline="0" dirty="0" err="1">
+                <a:solidFill>
+                  <a:srgbClr val="808000"/>
+                </a:solidFill>
+                <a:latin typeface="Courier New" panose="02070309020205020404" pitchFamily="49" charset="0"/>
+              </a:rPr>
+              <a:t>title</a:t>
+            </a:r>
+            <a:r>
+              <a:rPr lang="fr-BE" sz="1800" b="0" i="0" u="none" strike="noStrike" baseline="0" dirty="0">
+                <a:solidFill>
+                  <a:srgbClr val="808000"/>
+                </a:solidFill>
+                <a:latin typeface="Courier New" panose="02070309020205020404" pitchFamily="49" charset="0"/>
+              </a:rPr>
+              <a:t>`</a:t>
+            </a:r>
+            <a:r>
+              <a:rPr lang="fr-BE" sz="1800" b="0" i="0" u="none" strike="noStrike" baseline="0" dirty="0">
+                <a:solidFill>
+                  <a:srgbClr val="000000"/>
+                </a:solidFill>
+                <a:latin typeface="Courier New" panose="02070309020205020404" pitchFamily="49" charset="0"/>
+              </a:rPr>
+              <a:t> </a:t>
+            </a:r>
+            <a:r>
+              <a:rPr lang="fr-BE" sz="1800" b="1" i="0" u="none" strike="noStrike" baseline="0" dirty="0">
+                <a:solidFill>
+                  <a:srgbClr val="0000FF"/>
+                </a:solidFill>
+                <a:latin typeface="Courier New" panose="02070309020205020404" pitchFamily="49" charset="0"/>
+              </a:rPr>
+              <a:t>DESC</a:t>
+            </a:r>
+            <a:r>
+              <a:rPr lang="fr-BE" sz="1800" b="0" i="0" u="none" strike="noStrike" baseline="0" dirty="0">
+                <a:solidFill>
+                  <a:srgbClr val="0000FF"/>
+                </a:solidFill>
+                <a:latin typeface="Courier New" panose="02070309020205020404" pitchFamily="49" charset="0"/>
+              </a:rPr>
+              <a:t>;</a:t>
+            </a:r>
+          </a:p>
+          <a:p>
+            <a:endParaRPr lang="fr-BE" dirty="0"/>
+          </a:p>
+        </p:txBody>
+      </p:sp>
+    </p:spTree>
+    <p:extLst>
+      <p:ext uri="{BB962C8B-B14F-4D97-AF65-F5344CB8AC3E}">
+        <p14:creationId xmlns:p14="http://schemas.microsoft.com/office/powerpoint/2010/main" val="73591692"/>
       </p:ext>
     </p:extLst>
   </p:cSld>
@@ -9179,6 +10550,1272 @@
     <p:extLst>
       <p:ext uri="{BB962C8B-B14F-4D97-AF65-F5344CB8AC3E}">
         <p14:creationId xmlns:p14="http://schemas.microsoft.com/office/powerpoint/2010/main" val="3788376822"/>
+      </p:ext>
+    </p:extLst>
+  </p:cSld>
+  <p:clrMapOvr>
+    <a:masterClrMapping/>
+  </p:clrMapOvr>
+</p:sld>
+</file>
+
+<file path=ppt/slides/slide20.xml><?xml version="1.0" encoding="utf-8"?>
+<p:sld xmlns:a="http://schemas.openxmlformats.org/drawingml/2006/main" xmlns:r="http://schemas.openxmlformats.org/officeDocument/2006/relationships" xmlns:p="http://schemas.openxmlformats.org/presentationml/2006/main">
+  <p:cSld>
+    <p:spTree>
+      <p:nvGrpSpPr>
+        <p:cNvPr id="1" name=""/>
+        <p:cNvGrpSpPr/>
+        <p:nvPr/>
+      </p:nvGrpSpPr>
+      <p:grpSpPr>
+        <a:xfrm>
+          <a:off x="0" y="0"/>
+          <a:ext cx="0" cy="0"/>
+          <a:chOff x="0" y="0"/>
+          <a:chExt cx="0" cy="0"/>
+        </a:xfrm>
+      </p:grpSpPr>
+      <p:sp>
+        <p:nvSpPr>
+          <p:cNvPr id="2" name="Titre 1">
+            <a:extLst>
+              <a:ext uri="{FF2B5EF4-FFF2-40B4-BE49-F238E27FC236}">
+                <a16:creationId xmlns:a16="http://schemas.microsoft.com/office/drawing/2014/main" id="{5A49A4C8-A34F-A2E1-A775-16FF4FC6F9BF}"/>
+              </a:ext>
+            </a:extLst>
+          </p:cNvPr>
+          <p:cNvSpPr>
+            <a:spLocks noGrp="1"/>
+          </p:cNvSpPr>
+          <p:nvPr>
+            <p:ph type="title"/>
+          </p:nvPr>
+        </p:nvSpPr>
+        <p:spPr/>
+        <p:txBody>
+          <a:bodyPr/>
+          <a:lstStyle/>
+          <a:p>
+            <a:r>
+              <a:rPr lang="fr-FR" dirty="0"/>
+              <a:t>JOIN</a:t>
+            </a:r>
+            <a:endParaRPr lang="fr-BE" dirty="0"/>
+          </a:p>
+        </p:txBody>
+      </p:sp>
+      <p:sp>
+        <p:nvSpPr>
+          <p:cNvPr id="3" name="Espace réservé du contenu 2">
+            <a:extLst>
+              <a:ext uri="{FF2B5EF4-FFF2-40B4-BE49-F238E27FC236}">
+                <a16:creationId xmlns:a16="http://schemas.microsoft.com/office/drawing/2014/main" id="{D08A7CC5-3313-0AEB-2175-FDC7655D1347}"/>
+              </a:ext>
+            </a:extLst>
+          </p:cNvPr>
+          <p:cNvSpPr>
+            <a:spLocks noGrp="1"/>
+          </p:cNvSpPr>
+          <p:nvPr>
+            <p:ph idx="1"/>
+          </p:nvPr>
+        </p:nvSpPr>
+        <p:spPr>
+          <a:xfrm>
+            <a:off x="838200" y="1544715"/>
+            <a:ext cx="10515600" cy="4632248"/>
+          </a:xfrm>
+        </p:spPr>
+        <p:txBody>
+          <a:bodyPr/>
+          <a:lstStyle/>
+          <a:p>
+            <a:r>
+              <a:rPr lang="fr-FR" dirty="0"/>
+              <a:t>Croiser les données et profiter de la puissance des relations</a:t>
+            </a:r>
+          </a:p>
+          <a:p>
+            <a:r>
+              <a:rPr lang="fr-BE" dirty="0"/>
+              <a:t>Il existe plusieurs types de jointure: INNER JOIN, LEFT JOIN, RIGHT JOIN et CROSSE JOIN</a:t>
+            </a:r>
+          </a:p>
+          <a:p>
+            <a:pPr lvl="1"/>
+            <a:r>
+              <a:rPr lang="fr-BE" dirty="0">
+                <a:hlinkClick r:id="rId2"/>
+              </a:rPr>
+              <a:t>https://www.w3schools.com/mysql/mysql_join.asp</a:t>
+            </a:r>
+            <a:r>
+              <a:rPr lang="fr-BE" dirty="0"/>
+              <a:t> </a:t>
+            </a:r>
+          </a:p>
+          <a:p>
+            <a:r>
+              <a:rPr lang="fr-BE" dirty="0"/>
+              <a:t>Pour l’exercice, nous aurons besoin de INNER JOIN seulement</a:t>
+            </a:r>
+          </a:p>
+          <a:p>
+            <a:r>
+              <a:rPr lang="fr-BE" dirty="0"/>
+              <a:t>Syntaxe:</a:t>
+            </a:r>
+          </a:p>
+          <a:p>
+            <a:endParaRPr lang="fr-BE" dirty="0"/>
+          </a:p>
+          <a:p>
+            <a:endParaRPr lang="fr-BE" dirty="0"/>
+          </a:p>
+          <a:p>
+            <a:r>
+              <a:rPr lang="fr-BE" dirty="0"/>
+              <a:t>Exemple: </a:t>
+            </a:r>
+          </a:p>
+          <a:p>
+            <a:endParaRPr lang="fr-BE" dirty="0"/>
+          </a:p>
+        </p:txBody>
+      </p:sp>
+      <p:sp>
+        <p:nvSpPr>
+          <p:cNvPr id="4" name="ZoneTexte 3">
+            <a:extLst>
+              <a:ext uri="{FF2B5EF4-FFF2-40B4-BE49-F238E27FC236}">
+                <a16:creationId xmlns:a16="http://schemas.microsoft.com/office/drawing/2014/main" id="{2F3D4138-1FF0-AB3A-6E91-D8A28B4D083D}"/>
+              </a:ext>
+            </a:extLst>
+          </p:cNvPr>
+          <p:cNvSpPr txBox="1"/>
+          <p:nvPr/>
+        </p:nvSpPr>
+        <p:spPr>
+          <a:xfrm>
+            <a:off x="900344" y="4314547"/>
+            <a:ext cx="6391923" cy="1200329"/>
+          </a:xfrm>
+          <a:prstGeom prst="rect">
+            <a:avLst/>
+          </a:prstGeom>
+          <a:noFill/>
+        </p:spPr>
+        <p:txBody>
+          <a:bodyPr wrap="square" rtlCol="0">
+            <a:spAutoFit/>
+          </a:bodyPr>
+          <a:lstStyle/>
+          <a:p>
+            <a:r>
+              <a:rPr lang="en-US" dirty="0">
+                <a:solidFill>
+                  <a:srgbClr val="0000CD"/>
+                </a:solidFill>
+                <a:effectLst/>
+              </a:rPr>
+              <a:t>SELECT</a:t>
+            </a:r>
+            <a:r>
+              <a:rPr lang="en-US" dirty="0">
+                <a:solidFill>
+                  <a:srgbClr val="000000"/>
+                </a:solidFill>
+                <a:effectLst/>
+              </a:rPr>
+              <a:t> </a:t>
+            </a:r>
+            <a:r>
+              <a:rPr lang="en-US" i="1" dirty="0" err="1">
+                <a:solidFill>
+                  <a:srgbClr val="000000"/>
+                </a:solidFill>
+                <a:effectLst/>
+              </a:rPr>
+              <a:t>column_name</a:t>
+            </a:r>
+            <a:r>
+              <a:rPr lang="en-US" i="1" dirty="0">
+                <a:solidFill>
+                  <a:srgbClr val="000000"/>
+                </a:solidFill>
+                <a:effectLst/>
+              </a:rPr>
+              <a:t>(s)</a:t>
+            </a:r>
+            <a:br>
+              <a:rPr lang="en-US" dirty="0">
+                <a:solidFill>
+                  <a:srgbClr val="000000"/>
+                </a:solidFill>
+                <a:effectLst/>
+              </a:rPr>
+            </a:br>
+            <a:r>
+              <a:rPr lang="en-US" dirty="0">
+                <a:solidFill>
+                  <a:srgbClr val="0000CD"/>
+                </a:solidFill>
+                <a:effectLst/>
+              </a:rPr>
+              <a:t>FROM</a:t>
+            </a:r>
+            <a:r>
+              <a:rPr lang="en-US" dirty="0">
+                <a:solidFill>
+                  <a:srgbClr val="000000"/>
+                </a:solidFill>
+                <a:effectLst/>
+              </a:rPr>
+              <a:t> </a:t>
+            </a:r>
+            <a:r>
+              <a:rPr lang="en-US" i="1" dirty="0">
+                <a:solidFill>
+                  <a:srgbClr val="000000"/>
+                </a:solidFill>
+                <a:effectLst/>
+              </a:rPr>
+              <a:t>table1</a:t>
+            </a:r>
+            <a:br>
+              <a:rPr lang="en-US" dirty="0">
+                <a:solidFill>
+                  <a:srgbClr val="000000"/>
+                </a:solidFill>
+                <a:effectLst/>
+              </a:rPr>
+            </a:br>
+            <a:r>
+              <a:rPr lang="en-US" dirty="0">
+                <a:solidFill>
+                  <a:srgbClr val="0000CD"/>
+                </a:solidFill>
+                <a:effectLst/>
+              </a:rPr>
+              <a:t>INNER</a:t>
+            </a:r>
+            <a:r>
+              <a:rPr lang="en-US" dirty="0">
+                <a:solidFill>
+                  <a:srgbClr val="000000"/>
+                </a:solidFill>
+                <a:effectLst/>
+              </a:rPr>
+              <a:t> </a:t>
+            </a:r>
+            <a:r>
+              <a:rPr lang="en-US" dirty="0">
+                <a:solidFill>
+                  <a:srgbClr val="0000CD"/>
+                </a:solidFill>
+                <a:effectLst/>
+              </a:rPr>
+              <a:t>JOIN</a:t>
+            </a:r>
+            <a:r>
+              <a:rPr lang="en-US" dirty="0">
+                <a:solidFill>
+                  <a:srgbClr val="000000"/>
+                </a:solidFill>
+                <a:effectLst/>
+              </a:rPr>
+              <a:t> </a:t>
+            </a:r>
+            <a:r>
+              <a:rPr lang="en-US" i="1" dirty="0">
+                <a:solidFill>
+                  <a:srgbClr val="000000"/>
+                </a:solidFill>
+                <a:effectLst/>
+              </a:rPr>
+              <a:t>table2</a:t>
+            </a:r>
+            <a:br>
+              <a:rPr lang="en-US" i="1" dirty="0">
+                <a:solidFill>
+                  <a:srgbClr val="000000"/>
+                </a:solidFill>
+                <a:effectLst/>
+              </a:rPr>
+            </a:br>
+            <a:r>
+              <a:rPr lang="en-US" dirty="0">
+                <a:solidFill>
+                  <a:srgbClr val="0000CD"/>
+                </a:solidFill>
+                <a:effectLst/>
+              </a:rPr>
+              <a:t>ON</a:t>
+            </a:r>
+            <a:r>
+              <a:rPr lang="en-US" dirty="0">
+                <a:solidFill>
+                  <a:srgbClr val="000000"/>
+                </a:solidFill>
+                <a:effectLst/>
+              </a:rPr>
+              <a:t> </a:t>
+            </a:r>
+            <a:r>
+              <a:rPr lang="en-US" i="1" dirty="0">
+                <a:solidFill>
+                  <a:srgbClr val="000000"/>
+                </a:solidFill>
+                <a:effectLst/>
+              </a:rPr>
+              <a:t>table1.column_name </a:t>
+            </a:r>
+            <a:r>
+              <a:rPr lang="en-US" dirty="0">
+                <a:solidFill>
+                  <a:srgbClr val="000000"/>
+                </a:solidFill>
+                <a:effectLst/>
+              </a:rPr>
+              <a:t>=</a:t>
+            </a:r>
+            <a:r>
+              <a:rPr lang="en-US" i="1" dirty="0">
+                <a:solidFill>
+                  <a:srgbClr val="000000"/>
+                </a:solidFill>
+                <a:effectLst/>
+              </a:rPr>
+              <a:t> table2.column_name</a:t>
+            </a:r>
+            <a:r>
+              <a:rPr lang="en-US" dirty="0">
+                <a:solidFill>
+                  <a:srgbClr val="000000"/>
+                </a:solidFill>
+                <a:effectLst/>
+              </a:rPr>
+              <a:t>;</a:t>
+            </a:r>
+            <a:endParaRPr lang="fr-BE" dirty="0"/>
+          </a:p>
+        </p:txBody>
+      </p:sp>
+      <p:sp>
+        <p:nvSpPr>
+          <p:cNvPr id="5" name="ZoneTexte 4">
+            <a:extLst>
+              <a:ext uri="{FF2B5EF4-FFF2-40B4-BE49-F238E27FC236}">
+                <a16:creationId xmlns:a16="http://schemas.microsoft.com/office/drawing/2014/main" id="{A0AA305A-6EAE-9A4A-8210-0FA11AAABF0D}"/>
+              </a:ext>
+            </a:extLst>
+          </p:cNvPr>
+          <p:cNvSpPr txBox="1"/>
+          <p:nvPr/>
+        </p:nvSpPr>
+        <p:spPr>
+          <a:xfrm>
+            <a:off x="900344" y="5850384"/>
+            <a:ext cx="7199791" cy="923330"/>
+          </a:xfrm>
+          <a:prstGeom prst="rect">
+            <a:avLst/>
+          </a:prstGeom>
+          <a:noFill/>
+        </p:spPr>
+        <p:txBody>
+          <a:bodyPr wrap="square" rtlCol="0">
+            <a:spAutoFit/>
+          </a:bodyPr>
+          <a:lstStyle/>
+          <a:p>
+            <a:r>
+              <a:rPr lang="fr-BE" sz="1800" b="1" i="0" u="none" strike="noStrike" baseline="0" dirty="0">
+                <a:solidFill>
+                  <a:srgbClr val="0000FF"/>
+                </a:solidFill>
+                <a:latin typeface="Courier New" panose="02070309020205020404" pitchFamily="49" charset="0"/>
+              </a:rPr>
+              <a:t>SELECT</a:t>
+            </a:r>
+            <a:r>
+              <a:rPr lang="fr-BE" sz="1800" b="0" i="0" u="none" strike="noStrike" baseline="0" dirty="0">
+                <a:solidFill>
+                  <a:srgbClr val="000000"/>
+                </a:solidFill>
+                <a:latin typeface="Courier New" panose="02070309020205020404" pitchFamily="49" charset="0"/>
+              </a:rPr>
+              <a:t> </a:t>
+            </a:r>
+            <a:r>
+              <a:rPr lang="fr-BE" sz="1800" b="0" i="0" u="none" strike="noStrike" baseline="0" dirty="0">
+                <a:solidFill>
+                  <a:srgbClr val="0000FF"/>
+                </a:solidFill>
+                <a:latin typeface="Courier New" panose="02070309020205020404" pitchFamily="49" charset="0"/>
+              </a:rPr>
+              <a:t>*</a:t>
+            </a:r>
+            <a:r>
+              <a:rPr lang="fr-BE" sz="1800" b="0" i="0" u="none" strike="noStrike" baseline="0" dirty="0">
+                <a:solidFill>
+                  <a:srgbClr val="000000"/>
+                </a:solidFill>
+                <a:latin typeface="Courier New" panose="02070309020205020404" pitchFamily="49" charset="0"/>
+              </a:rPr>
+              <a:t> </a:t>
+            </a:r>
+            <a:r>
+              <a:rPr lang="fr-BE" sz="1800" b="1" i="0" u="none" strike="noStrike" baseline="0" dirty="0">
+                <a:solidFill>
+                  <a:srgbClr val="0000FF"/>
+                </a:solidFill>
+                <a:latin typeface="Courier New" panose="02070309020205020404" pitchFamily="49" charset="0"/>
+              </a:rPr>
+              <a:t>FROM</a:t>
+            </a:r>
+            <a:r>
+              <a:rPr lang="fr-BE" sz="1800" b="0" i="0" u="none" strike="noStrike" baseline="0" dirty="0">
+                <a:solidFill>
+                  <a:srgbClr val="000000"/>
+                </a:solidFill>
+                <a:latin typeface="Courier New" panose="02070309020205020404" pitchFamily="49" charset="0"/>
+              </a:rPr>
+              <a:t> </a:t>
+            </a:r>
+            <a:r>
+              <a:rPr lang="fr-BE" sz="1800" b="0" i="0" u="none" strike="noStrike" baseline="0" dirty="0" err="1">
+                <a:solidFill>
+                  <a:srgbClr val="FF00FF"/>
+                </a:solidFill>
+                <a:latin typeface="Courier New" panose="02070309020205020404" pitchFamily="49" charset="0"/>
+              </a:rPr>
+              <a:t>players</a:t>
+            </a:r>
+            <a:endParaRPr lang="fr-BE" sz="1800" b="0" i="0" u="none" strike="noStrike" baseline="0" dirty="0">
+              <a:solidFill>
+                <a:srgbClr val="FF00FF"/>
+              </a:solidFill>
+              <a:latin typeface="Courier New" panose="02070309020205020404" pitchFamily="49" charset="0"/>
+            </a:endParaRPr>
+          </a:p>
+          <a:p>
+            <a:r>
+              <a:rPr lang="en-US" sz="1800" b="1" i="0" u="none" strike="noStrike" baseline="0" dirty="0">
+                <a:solidFill>
+                  <a:srgbClr val="0000FF"/>
+                </a:solidFill>
+                <a:latin typeface="Courier New" panose="02070309020205020404" pitchFamily="49" charset="0"/>
+              </a:rPr>
+              <a:t>INNER</a:t>
+            </a:r>
+            <a:r>
+              <a:rPr lang="en-US" sz="1800" b="0" i="0" u="none" strike="noStrike" baseline="0" dirty="0">
+                <a:solidFill>
+                  <a:srgbClr val="000000"/>
+                </a:solidFill>
+                <a:latin typeface="Courier New" panose="02070309020205020404" pitchFamily="49" charset="0"/>
+              </a:rPr>
+              <a:t> </a:t>
+            </a:r>
+            <a:r>
+              <a:rPr lang="en-US" sz="1800" b="1" i="0" u="none" strike="noStrike" baseline="0" dirty="0">
+                <a:solidFill>
+                  <a:srgbClr val="0000FF"/>
+                </a:solidFill>
+                <a:latin typeface="Courier New" panose="02070309020205020404" pitchFamily="49" charset="0"/>
+              </a:rPr>
+              <a:t>JOIN</a:t>
+            </a:r>
+            <a:r>
+              <a:rPr lang="en-US" sz="1800" b="0" i="0" u="none" strike="noStrike" baseline="0" dirty="0">
+                <a:solidFill>
+                  <a:srgbClr val="000000"/>
+                </a:solidFill>
+                <a:latin typeface="Courier New" panose="02070309020205020404" pitchFamily="49" charset="0"/>
+              </a:rPr>
+              <a:t> </a:t>
+            </a:r>
+            <a:r>
+              <a:rPr lang="en-US" sz="1800" b="0" i="0" u="none" strike="noStrike" baseline="0" dirty="0">
+                <a:solidFill>
+                  <a:srgbClr val="FF00FF"/>
+                </a:solidFill>
+                <a:latin typeface="Courier New" panose="02070309020205020404" pitchFamily="49" charset="0"/>
+              </a:rPr>
+              <a:t>teams</a:t>
+            </a:r>
+            <a:r>
+              <a:rPr lang="en-US" sz="1800" b="0" i="0" u="none" strike="noStrike" baseline="0" dirty="0">
+                <a:solidFill>
+                  <a:srgbClr val="000000"/>
+                </a:solidFill>
+                <a:latin typeface="Courier New" panose="02070309020205020404" pitchFamily="49" charset="0"/>
+              </a:rPr>
+              <a:t> </a:t>
+            </a:r>
+            <a:r>
+              <a:rPr lang="en-US" sz="1800" b="1" i="0" u="none" strike="noStrike" baseline="0" dirty="0">
+                <a:solidFill>
+                  <a:srgbClr val="0000FF"/>
+                </a:solidFill>
+                <a:latin typeface="Courier New" panose="02070309020205020404" pitchFamily="49" charset="0"/>
+              </a:rPr>
+              <a:t>ON</a:t>
+            </a:r>
+            <a:r>
+              <a:rPr lang="en-US" sz="1800" b="0" i="0" u="none" strike="noStrike" baseline="0" dirty="0">
+                <a:solidFill>
+                  <a:srgbClr val="000000"/>
+                </a:solidFill>
+                <a:latin typeface="Courier New" panose="02070309020205020404" pitchFamily="49" charset="0"/>
+              </a:rPr>
+              <a:t> </a:t>
+            </a:r>
+            <a:r>
+              <a:rPr lang="en-US" sz="1800" b="0" i="0" u="none" strike="noStrike" baseline="0" dirty="0" err="1">
+                <a:solidFill>
+                  <a:srgbClr val="FF00FF"/>
+                </a:solidFill>
+                <a:latin typeface="Courier New" panose="02070309020205020404" pitchFamily="49" charset="0"/>
+              </a:rPr>
+              <a:t>players</a:t>
+            </a:r>
+            <a:r>
+              <a:rPr lang="en-US" sz="1800" b="0" i="0" u="none" strike="noStrike" baseline="0" dirty="0" err="1">
+                <a:solidFill>
+                  <a:srgbClr val="0000FF"/>
+                </a:solidFill>
+                <a:latin typeface="Courier New" panose="02070309020205020404" pitchFamily="49" charset="0"/>
+              </a:rPr>
+              <a:t>.</a:t>
+            </a:r>
+            <a:r>
+              <a:rPr lang="en-US" sz="1800" b="0" i="0" u="none" strike="noStrike" baseline="0" dirty="0" err="1">
+                <a:solidFill>
+                  <a:srgbClr val="808000"/>
+                </a:solidFill>
+                <a:latin typeface="Courier New" panose="02070309020205020404" pitchFamily="49" charset="0"/>
+              </a:rPr>
+              <a:t>team_id</a:t>
+            </a:r>
+            <a:r>
+              <a:rPr lang="en-US" sz="1800" b="0" i="0" u="none" strike="noStrike" baseline="0" dirty="0">
+                <a:solidFill>
+                  <a:srgbClr val="000000"/>
+                </a:solidFill>
+                <a:latin typeface="Courier New" panose="02070309020205020404" pitchFamily="49" charset="0"/>
+              </a:rPr>
+              <a:t> </a:t>
+            </a:r>
+            <a:r>
+              <a:rPr lang="en-US" sz="1800" b="0" i="0" u="none" strike="noStrike" baseline="0" dirty="0">
+                <a:solidFill>
+                  <a:srgbClr val="0000FF"/>
+                </a:solidFill>
+                <a:latin typeface="Courier New" panose="02070309020205020404" pitchFamily="49" charset="0"/>
+              </a:rPr>
+              <a:t>=</a:t>
+            </a:r>
+            <a:r>
+              <a:rPr lang="en-US" sz="1800" b="0" i="0" u="none" strike="noStrike" baseline="0" dirty="0">
+                <a:solidFill>
+                  <a:srgbClr val="000000"/>
+                </a:solidFill>
+                <a:latin typeface="Courier New" panose="02070309020205020404" pitchFamily="49" charset="0"/>
+              </a:rPr>
+              <a:t> </a:t>
+            </a:r>
+            <a:r>
+              <a:rPr lang="en-US" sz="1800" b="0" i="0" u="none" strike="noStrike" baseline="0" dirty="0">
+                <a:solidFill>
+                  <a:srgbClr val="FF00FF"/>
+                </a:solidFill>
+                <a:latin typeface="Courier New" panose="02070309020205020404" pitchFamily="49" charset="0"/>
+              </a:rPr>
+              <a:t>teams</a:t>
+            </a:r>
+            <a:r>
+              <a:rPr lang="en-US" sz="1800" b="0" i="0" u="none" strike="noStrike" baseline="0" dirty="0">
+                <a:solidFill>
+                  <a:srgbClr val="0000FF"/>
+                </a:solidFill>
+                <a:latin typeface="Courier New" panose="02070309020205020404" pitchFamily="49" charset="0"/>
+              </a:rPr>
+              <a:t>.</a:t>
+            </a:r>
+            <a:r>
+              <a:rPr lang="en-US" sz="1800" b="0" i="0" u="none" strike="noStrike" baseline="0" dirty="0">
+                <a:solidFill>
+                  <a:srgbClr val="808000"/>
+                </a:solidFill>
+                <a:latin typeface="Courier New" panose="02070309020205020404" pitchFamily="49" charset="0"/>
+              </a:rPr>
+              <a:t>id</a:t>
+            </a:r>
+            <a:r>
+              <a:rPr lang="en-US" sz="1800" b="0" i="0" u="none" strike="noStrike" baseline="0" dirty="0">
+                <a:solidFill>
+                  <a:srgbClr val="0000FF"/>
+                </a:solidFill>
+                <a:latin typeface="Courier New" panose="02070309020205020404" pitchFamily="49" charset="0"/>
+              </a:rPr>
+              <a:t>;</a:t>
+            </a:r>
+          </a:p>
+          <a:p>
+            <a:endParaRPr lang="fr-BE" dirty="0"/>
+          </a:p>
+        </p:txBody>
+      </p:sp>
+    </p:spTree>
+    <p:extLst>
+      <p:ext uri="{BB962C8B-B14F-4D97-AF65-F5344CB8AC3E}">
+        <p14:creationId xmlns:p14="http://schemas.microsoft.com/office/powerpoint/2010/main" val="3052465845"/>
+      </p:ext>
+    </p:extLst>
+  </p:cSld>
+  <p:clrMapOvr>
+    <a:masterClrMapping/>
+  </p:clrMapOvr>
+</p:sld>
+</file>
+
+<file path=ppt/slides/slide21.xml><?xml version="1.0" encoding="utf-8"?>
+<p:sld xmlns:a="http://schemas.openxmlformats.org/drawingml/2006/main" xmlns:r="http://schemas.openxmlformats.org/officeDocument/2006/relationships" xmlns:p="http://schemas.openxmlformats.org/presentationml/2006/main">
+  <p:cSld>
+    <p:spTree>
+      <p:nvGrpSpPr>
+        <p:cNvPr id="1" name=""/>
+        <p:cNvGrpSpPr/>
+        <p:nvPr/>
+      </p:nvGrpSpPr>
+      <p:grpSpPr>
+        <a:xfrm>
+          <a:off x="0" y="0"/>
+          <a:ext cx="0" cy="0"/>
+          <a:chOff x="0" y="0"/>
+          <a:chExt cx="0" cy="0"/>
+        </a:xfrm>
+      </p:grpSpPr>
+      <p:sp>
+        <p:nvSpPr>
+          <p:cNvPr id="2" name="Titre 1">
+            <a:extLst>
+              <a:ext uri="{FF2B5EF4-FFF2-40B4-BE49-F238E27FC236}">
+                <a16:creationId xmlns:a16="http://schemas.microsoft.com/office/drawing/2014/main" id="{ADDB7C44-9336-D776-2903-110B3EB8B74E}"/>
+              </a:ext>
+            </a:extLst>
+          </p:cNvPr>
+          <p:cNvSpPr>
+            <a:spLocks noGrp="1"/>
+          </p:cNvSpPr>
+          <p:nvPr>
+            <p:ph type="title"/>
+          </p:nvPr>
+        </p:nvSpPr>
+        <p:spPr/>
+        <p:txBody>
+          <a:bodyPr>
+            <a:normAutofit/>
+          </a:bodyPr>
+          <a:lstStyle/>
+          <a:p>
+            <a:r>
+              <a:rPr lang="fr-FR" dirty="0"/>
+              <a:t>SELECT exercices</a:t>
+            </a:r>
+            <a:br>
+              <a:rPr lang="fr-FR" dirty="0"/>
+            </a:br>
+            <a:r>
+              <a:rPr lang="fr-FR" sz="2400" dirty="0"/>
+              <a:t>J’ai écris les exercices en anglais pour vous habituer</a:t>
+            </a:r>
+            <a:endParaRPr lang="fr-BE" dirty="0"/>
+          </a:p>
+        </p:txBody>
+      </p:sp>
+      <p:sp>
+        <p:nvSpPr>
+          <p:cNvPr id="3" name="Espace réservé du contenu 2">
+            <a:extLst>
+              <a:ext uri="{FF2B5EF4-FFF2-40B4-BE49-F238E27FC236}">
+                <a16:creationId xmlns:a16="http://schemas.microsoft.com/office/drawing/2014/main" id="{E8DB991F-9E81-A53D-BD63-54736ED881DA}"/>
+              </a:ext>
+            </a:extLst>
+          </p:cNvPr>
+          <p:cNvSpPr>
+            <a:spLocks noGrp="1"/>
+          </p:cNvSpPr>
+          <p:nvPr>
+            <p:ph idx="1"/>
+          </p:nvPr>
+        </p:nvSpPr>
+        <p:spPr/>
+        <p:txBody>
+          <a:bodyPr>
+            <a:normAutofit/>
+          </a:bodyPr>
+          <a:lstStyle/>
+          <a:p>
+            <a:r>
+              <a:rPr lang="en-GB" dirty="0"/>
+              <a:t>Select all players (id, name, </a:t>
+            </a:r>
+            <a:r>
+              <a:rPr lang="en-GB" dirty="0" err="1"/>
+              <a:t>first_name</a:t>
+            </a:r>
+            <a:r>
+              <a:rPr lang="en-GB" dirty="0"/>
+              <a:t> and </a:t>
+            </a:r>
+            <a:r>
+              <a:rPr lang="en-GB" dirty="0" err="1"/>
+              <a:t>bib_number</a:t>
+            </a:r>
+            <a:r>
+              <a:rPr lang="en-GB" dirty="0"/>
+              <a:t>)</a:t>
+            </a:r>
+          </a:p>
+          <a:p>
+            <a:r>
+              <a:rPr lang="en-GB" dirty="0"/>
+              <a:t>Select only the players with a name starting by ‘A’</a:t>
+            </a:r>
+          </a:p>
+          <a:p>
+            <a:r>
+              <a:rPr lang="en-GB" dirty="0"/>
+              <a:t>Select only the players with a ‘a’ inside their name</a:t>
+            </a:r>
+          </a:p>
+          <a:p>
+            <a:r>
+              <a:rPr lang="en-GB" dirty="0"/>
+              <a:t>Select the players with their team’s name and </a:t>
+            </a:r>
+            <a:r>
+              <a:rPr lang="en-GB" dirty="0" err="1"/>
+              <a:t>color</a:t>
+            </a:r>
+            <a:endParaRPr lang="en-GB" dirty="0"/>
+          </a:p>
+          <a:p>
+            <a:r>
+              <a:rPr lang="en-GB" dirty="0"/>
+              <a:t>Select all the team’s countries but the must appear only once.</a:t>
+            </a:r>
+          </a:p>
+          <a:p>
+            <a:r>
+              <a:rPr lang="en-GB" dirty="0"/>
+              <a:t>Select the matches planned in the future</a:t>
+            </a:r>
+          </a:p>
+          <a:p>
+            <a:r>
+              <a:rPr lang="en-GB" dirty="0"/>
+              <a:t>Select the finished matches</a:t>
+            </a:r>
+          </a:p>
+          <a:p>
+            <a:r>
+              <a:rPr lang="en-GB" dirty="0"/>
+              <a:t>Select all the players involved in a match via their team. </a:t>
+            </a:r>
+          </a:p>
+          <a:p>
+            <a:endParaRPr lang="fr-BE" dirty="0"/>
+          </a:p>
+        </p:txBody>
+      </p:sp>
+    </p:spTree>
+    <p:extLst>
+      <p:ext uri="{BB962C8B-B14F-4D97-AF65-F5344CB8AC3E}">
+        <p14:creationId xmlns:p14="http://schemas.microsoft.com/office/powerpoint/2010/main" val="3283928943"/>
+      </p:ext>
+    </p:extLst>
+  </p:cSld>
+  <p:clrMapOvr>
+    <a:masterClrMapping/>
+  </p:clrMapOvr>
+</p:sld>
+</file>
+
+<file path=ppt/slides/slide22.xml><?xml version="1.0" encoding="utf-8"?>
+<p:sld xmlns:a="http://schemas.openxmlformats.org/drawingml/2006/main" xmlns:r="http://schemas.openxmlformats.org/officeDocument/2006/relationships" xmlns:p="http://schemas.openxmlformats.org/presentationml/2006/main">
+  <p:cSld>
+    <p:spTree>
+      <p:nvGrpSpPr>
+        <p:cNvPr id="1" name=""/>
+        <p:cNvGrpSpPr/>
+        <p:nvPr/>
+      </p:nvGrpSpPr>
+      <p:grpSpPr>
+        <a:xfrm>
+          <a:off x="0" y="0"/>
+          <a:ext cx="0" cy="0"/>
+          <a:chOff x="0" y="0"/>
+          <a:chExt cx="0" cy="0"/>
+        </a:xfrm>
+      </p:grpSpPr>
+      <p:sp>
+        <p:nvSpPr>
+          <p:cNvPr id="2" name="Titre 1">
+            <a:extLst>
+              <a:ext uri="{FF2B5EF4-FFF2-40B4-BE49-F238E27FC236}">
+                <a16:creationId xmlns:a16="http://schemas.microsoft.com/office/drawing/2014/main" id="{D80988B8-63C7-3E7E-9FF5-806DC9675523}"/>
+              </a:ext>
+            </a:extLst>
+          </p:cNvPr>
+          <p:cNvSpPr>
+            <a:spLocks noGrp="1"/>
+          </p:cNvSpPr>
+          <p:nvPr>
+            <p:ph type="title"/>
+          </p:nvPr>
+        </p:nvSpPr>
+        <p:spPr/>
+        <p:txBody>
+          <a:bodyPr/>
+          <a:lstStyle/>
+          <a:p>
+            <a:r>
+              <a:rPr lang="fr-FR" dirty="0"/>
+              <a:t>More select exercices</a:t>
+            </a:r>
+            <a:endParaRPr lang="fr-BE" dirty="0"/>
+          </a:p>
+        </p:txBody>
+      </p:sp>
+      <p:sp>
+        <p:nvSpPr>
+          <p:cNvPr id="3" name="Espace réservé du contenu 2">
+            <a:extLst>
+              <a:ext uri="{FF2B5EF4-FFF2-40B4-BE49-F238E27FC236}">
+                <a16:creationId xmlns:a16="http://schemas.microsoft.com/office/drawing/2014/main" id="{BC7B860A-B6BD-AD7A-FD88-FFF46E6CBAB4}"/>
+              </a:ext>
+            </a:extLst>
+          </p:cNvPr>
+          <p:cNvSpPr>
+            <a:spLocks noGrp="1"/>
+          </p:cNvSpPr>
+          <p:nvPr>
+            <p:ph idx="1"/>
+          </p:nvPr>
+        </p:nvSpPr>
+        <p:spPr/>
+        <p:txBody>
+          <a:bodyPr/>
+          <a:lstStyle/>
+          <a:p>
+            <a:r>
+              <a:rPr lang="en-GB" dirty="0"/>
+              <a:t>Find the highest score of the tournament and select the corresponding game it was for.</a:t>
+            </a:r>
+          </a:p>
+          <a:p>
+            <a:r>
+              <a:rPr lang="en-GB" dirty="0"/>
+              <a:t>Create a query that display the match schedule for a team. Add the game, the room and the referee information</a:t>
+            </a:r>
+          </a:p>
+          <a:p>
+            <a:r>
+              <a:rPr lang="en-GB" dirty="0"/>
+              <a:t>Create a query that display the match schedule for a player.</a:t>
+            </a:r>
+          </a:p>
+          <a:p>
+            <a:r>
+              <a:rPr lang="en-GB" dirty="0"/>
+              <a:t>Find which team scored the most at ‘Dota 2’</a:t>
+            </a:r>
+          </a:p>
+          <a:p>
+            <a:endParaRPr lang="fr-FR" dirty="0"/>
+          </a:p>
+          <a:p>
+            <a:endParaRPr lang="fr-BE" dirty="0"/>
+          </a:p>
+        </p:txBody>
+      </p:sp>
+    </p:spTree>
+    <p:extLst>
+      <p:ext uri="{BB962C8B-B14F-4D97-AF65-F5344CB8AC3E}">
+        <p14:creationId xmlns:p14="http://schemas.microsoft.com/office/powerpoint/2010/main" val="519460832"/>
+      </p:ext>
+    </p:extLst>
+  </p:cSld>
+  <p:clrMapOvr>
+    <a:masterClrMapping/>
+  </p:clrMapOvr>
+</p:sld>
+</file>
+
+<file path=ppt/slides/slide23.xml><?xml version="1.0" encoding="utf-8"?>
+<p:sld xmlns:a="http://schemas.openxmlformats.org/drawingml/2006/main" xmlns:r="http://schemas.openxmlformats.org/officeDocument/2006/relationships" xmlns:p="http://schemas.openxmlformats.org/presentationml/2006/main">
+  <p:cSld>
+    <p:spTree>
+      <p:nvGrpSpPr>
+        <p:cNvPr id="1" name=""/>
+        <p:cNvGrpSpPr/>
+        <p:nvPr/>
+      </p:nvGrpSpPr>
+      <p:grpSpPr>
+        <a:xfrm>
+          <a:off x="0" y="0"/>
+          <a:ext cx="0" cy="0"/>
+          <a:chOff x="0" y="0"/>
+          <a:chExt cx="0" cy="0"/>
+        </a:xfrm>
+      </p:grpSpPr>
+      <p:sp>
+        <p:nvSpPr>
+          <p:cNvPr id="2" name="Titre 1">
+            <a:extLst>
+              <a:ext uri="{FF2B5EF4-FFF2-40B4-BE49-F238E27FC236}">
+                <a16:creationId xmlns:a16="http://schemas.microsoft.com/office/drawing/2014/main" id="{25AE0EC8-8C4B-4854-6207-5950A432058B}"/>
+              </a:ext>
+            </a:extLst>
+          </p:cNvPr>
+          <p:cNvSpPr>
+            <a:spLocks noGrp="1"/>
+          </p:cNvSpPr>
+          <p:nvPr>
+            <p:ph type="title"/>
+          </p:nvPr>
+        </p:nvSpPr>
+        <p:spPr/>
+        <p:txBody>
+          <a:bodyPr/>
+          <a:lstStyle/>
+          <a:p>
+            <a:r>
+              <a:rPr lang="fr-FR" dirty="0"/>
+              <a:t>UPDATE exercices</a:t>
+            </a:r>
+            <a:endParaRPr lang="fr-BE" dirty="0"/>
+          </a:p>
+        </p:txBody>
+      </p:sp>
+      <p:sp>
+        <p:nvSpPr>
+          <p:cNvPr id="3" name="Espace réservé du contenu 2">
+            <a:extLst>
+              <a:ext uri="{FF2B5EF4-FFF2-40B4-BE49-F238E27FC236}">
+                <a16:creationId xmlns:a16="http://schemas.microsoft.com/office/drawing/2014/main" id="{9AD83822-C1A3-CDDC-A909-7A62FAB85352}"/>
+              </a:ext>
+            </a:extLst>
+          </p:cNvPr>
+          <p:cNvSpPr>
+            <a:spLocks noGrp="1"/>
+          </p:cNvSpPr>
+          <p:nvPr>
+            <p:ph idx="1"/>
+          </p:nvPr>
+        </p:nvSpPr>
+        <p:spPr/>
+        <p:txBody>
+          <a:bodyPr/>
+          <a:lstStyle/>
+          <a:p>
+            <a:r>
+              <a:rPr lang="fr-FR" dirty="0"/>
+              <a:t>The ‘</a:t>
+            </a:r>
+            <a:r>
+              <a:rPr lang="fr-FR" dirty="0" err="1"/>
+              <a:t>red</a:t>
+            </a:r>
+            <a:r>
+              <a:rPr lang="fr-FR" dirty="0"/>
+              <a:t>’ team </a:t>
+            </a:r>
+            <a:r>
+              <a:rPr lang="fr-FR" dirty="0" err="1"/>
+              <a:t>is</a:t>
+            </a:r>
+            <a:r>
+              <a:rPr lang="fr-FR" dirty="0"/>
+              <a:t> </a:t>
+            </a:r>
+            <a:r>
+              <a:rPr lang="fr-FR" dirty="0" err="1"/>
+              <a:t>now</a:t>
+            </a:r>
+            <a:r>
+              <a:rPr lang="fr-FR" dirty="0"/>
+              <a:t> the ‘</a:t>
+            </a:r>
+            <a:r>
+              <a:rPr lang="fr-FR" dirty="0" err="1"/>
+              <a:t>pink</a:t>
+            </a:r>
+            <a:r>
+              <a:rPr lang="fr-FR" dirty="0"/>
+              <a:t>’ team</a:t>
+            </a:r>
+          </a:p>
+          <a:p>
+            <a:r>
+              <a:rPr lang="fr-FR" dirty="0"/>
+              <a:t>Update all </a:t>
+            </a:r>
+            <a:r>
+              <a:rPr lang="fr-FR" dirty="0" err="1"/>
+              <a:t>players</a:t>
+            </a:r>
+            <a:r>
+              <a:rPr lang="fr-FR" dirty="0"/>
+              <a:t> </a:t>
+            </a:r>
+            <a:r>
+              <a:rPr lang="fr-FR" dirty="0" err="1"/>
+              <a:t>names</a:t>
+            </a:r>
+            <a:r>
+              <a:rPr lang="fr-FR" dirty="0"/>
+              <a:t> </a:t>
+            </a:r>
+            <a:r>
+              <a:rPr lang="fr-FR" dirty="0" err="1"/>
+              <a:t>fields</a:t>
+            </a:r>
+            <a:r>
+              <a:rPr lang="fr-FR" dirty="0"/>
+              <a:t> to </a:t>
+            </a:r>
+            <a:r>
+              <a:rPr lang="fr-FR" dirty="0" err="1"/>
+              <a:t>ensure</a:t>
+            </a:r>
+            <a:r>
+              <a:rPr lang="fr-FR" dirty="0"/>
+              <a:t> </a:t>
+            </a:r>
+            <a:r>
+              <a:rPr lang="fr-FR" dirty="0" err="1"/>
+              <a:t>it</a:t>
+            </a:r>
+            <a:r>
+              <a:rPr lang="fr-FR" dirty="0"/>
+              <a:t> starts </a:t>
+            </a:r>
+            <a:r>
+              <a:rPr lang="fr-FR" dirty="0" err="1"/>
+              <a:t>upper</a:t>
+            </a:r>
+            <a:r>
+              <a:rPr lang="fr-FR" dirty="0"/>
+              <a:t> case.</a:t>
+            </a:r>
+          </a:p>
+          <a:p>
+            <a:endParaRPr lang="fr-BE" dirty="0"/>
+          </a:p>
+        </p:txBody>
+      </p:sp>
+    </p:spTree>
+    <p:extLst>
+      <p:ext uri="{BB962C8B-B14F-4D97-AF65-F5344CB8AC3E}">
+        <p14:creationId xmlns:p14="http://schemas.microsoft.com/office/powerpoint/2010/main" val="2612689474"/>
+      </p:ext>
+    </p:extLst>
+  </p:cSld>
+  <p:clrMapOvr>
+    <a:masterClrMapping/>
+  </p:clrMapOvr>
+</p:sld>
+</file>
+
+<file path=ppt/slides/slide24.xml><?xml version="1.0" encoding="utf-8"?>
+<p:sld xmlns:a="http://schemas.openxmlformats.org/drawingml/2006/main" xmlns:r="http://schemas.openxmlformats.org/officeDocument/2006/relationships" xmlns:p="http://schemas.openxmlformats.org/presentationml/2006/main">
+  <p:cSld>
+    <p:spTree>
+      <p:nvGrpSpPr>
+        <p:cNvPr id="1" name=""/>
+        <p:cNvGrpSpPr/>
+        <p:nvPr/>
+      </p:nvGrpSpPr>
+      <p:grpSpPr>
+        <a:xfrm>
+          <a:off x="0" y="0"/>
+          <a:ext cx="0" cy="0"/>
+          <a:chOff x="0" y="0"/>
+          <a:chExt cx="0" cy="0"/>
+        </a:xfrm>
+      </p:grpSpPr>
+      <p:sp>
+        <p:nvSpPr>
+          <p:cNvPr id="2" name="Titre 1">
+            <a:extLst>
+              <a:ext uri="{FF2B5EF4-FFF2-40B4-BE49-F238E27FC236}">
+                <a16:creationId xmlns:a16="http://schemas.microsoft.com/office/drawing/2014/main" id="{FC0F86FF-E9A6-7DFD-9527-8B7CD5D82FCD}"/>
+              </a:ext>
+            </a:extLst>
+          </p:cNvPr>
+          <p:cNvSpPr>
+            <a:spLocks noGrp="1"/>
+          </p:cNvSpPr>
+          <p:nvPr>
+            <p:ph type="title"/>
+          </p:nvPr>
+        </p:nvSpPr>
+        <p:spPr/>
+        <p:txBody>
+          <a:bodyPr/>
+          <a:lstStyle/>
+          <a:p>
+            <a:r>
+              <a:rPr lang="fr-FR" dirty="0"/>
+              <a:t>DELETE exercices</a:t>
+            </a:r>
+            <a:endParaRPr lang="fr-BE" dirty="0"/>
+          </a:p>
+        </p:txBody>
+      </p:sp>
+      <p:sp>
+        <p:nvSpPr>
+          <p:cNvPr id="3" name="Espace réservé du contenu 2">
+            <a:extLst>
+              <a:ext uri="{FF2B5EF4-FFF2-40B4-BE49-F238E27FC236}">
+                <a16:creationId xmlns:a16="http://schemas.microsoft.com/office/drawing/2014/main" id="{D7EBFD29-1A42-FBED-2093-C0F69D732B0D}"/>
+              </a:ext>
+            </a:extLst>
+          </p:cNvPr>
+          <p:cNvSpPr>
+            <a:spLocks noGrp="1"/>
+          </p:cNvSpPr>
+          <p:nvPr>
+            <p:ph idx="1"/>
+          </p:nvPr>
+        </p:nvSpPr>
+        <p:spPr/>
+        <p:txBody>
+          <a:bodyPr/>
+          <a:lstStyle/>
+          <a:p>
+            <a:r>
+              <a:rPr lang="fr-FR" dirty="0" err="1"/>
+              <a:t>Add</a:t>
+            </a:r>
+            <a:r>
+              <a:rPr lang="fr-FR" dirty="0"/>
+              <a:t> a </a:t>
+            </a:r>
+            <a:r>
+              <a:rPr lang="fr-FR" dirty="0" err="1"/>
+              <a:t>player</a:t>
+            </a:r>
+            <a:r>
+              <a:rPr lang="fr-FR" dirty="0"/>
+              <a:t> to a team and </a:t>
+            </a:r>
+            <a:r>
+              <a:rPr lang="fr-FR" dirty="0" err="1"/>
+              <a:t>try</a:t>
+            </a:r>
+            <a:r>
+              <a:rPr lang="fr-FR" dirty="0"/>
+              <a:t> to </a:t>
+            </a:r>
+            <a:r>
+              <a:rPr lang="fr-FR" dirty="0" err="1"/>
+              <a:t>delete</a:t>
+            </a:r>
+            <a:r>
+              <a:rPr lang="fr-FR" dirty="0"/>
+              <a:t> the team. </a:t>
+            </a:r>
+            <a:r>
+              <a:rPr lang="fr-FR" dirty="0" err="1"/>
+              <a:t>What</a:t>
+            </a:r>
+            <a:r>
+              <a:rPr lang="fr-FR" dirty="0"/>
+              <a:t> </a:t>
+            </a:r>
+            <a:r>
+              <a:rPr lang="fr-FR" dirty="0" err="1"/>
+              <a:t>happen</a:t>
+            </a:r>
+            <a:r>
+              <a:rPr lang="fr-FR" dirty="0"/>
+              <a:t> ?</a:t>
+            </a:r>
+          </a:p>
+          <a:p>
+            <a:r>
+              <a:rPr lang="fr-BE" dirty="0" err="1"/>
+              <a:t>Delete</a:t>
+            </a:r>
+            <a:r>
+              <a:rPr lang="fr-BE" dirty="0"/>
+              <a:t> the </a:t>
+            </a:r>
+            <a:r>
+              <a:rPr lang="fr-BE" dirty="0" err="1"/>
+              <a:t>player</a:t>
+            </a:r>
+            <a:r>
+              <a:rPr lang="fr-BE" dirty="0"/>
+              <a:t> and </a:t>
+            </a:r>
+            <a:r>
+              <a:rPr lang="fr-BE" dirty="0" err="1"/>
+              <a:t>try</a:t>
+            </a:r>
+            <a:r>
+              <a:rPr lang="fr-BE" dirty="0"/>
+              <a:t> to </a:t>
+            </a:r>
+            <a:r>
+              <a:rPr lang="fr-BE" dirty="0" err="1"/>
+              <a:t>delete</a:t>
+            </a:r>
+            <a:r>
+              <a:rPr lang="fr-BE" dirty="0"/>
+              <a:t> the team.</a:t>
+            </a:r>
+          </a:p>
+          <a:p>
+            <a:r>
+              <a:rPr lang="fr-BE" dirty="0" err="1"/>
+              <a:t>Delete</a:t>
+            </a:r>
+            <a:r>
+              <a:rPr lang="fr-BE" dirty="0"/>
+              <a:t> all </a:t>
+            </a:r>
+            <a:r>
+              <a:rPr lang="fr-BE" dirty="0" err="1"/>
+              <a:t>games</a:t>
+            </a:r>
+            <a:r>
+              <a:rPr lang="fr-BE" dirty="0"/>
+              <a:t> not </a:t>
+            </a:r>
+            <a:r>
+              <a:rPr lang="fr-BE" dirty="0" err="1"/>
+              <a:t>used</a:t>
+            </a:r>
+            <a:r>
+              <a:rPr lang="fr-BE" dirty="0"/>
+              <a:t> in a match.</a:t>
+            </a:r>
+            <a:endParaRPr lang="fr-FR" dirty="0"/>
+          </a:p>
+        </p:txBody>
+      </p:sp>
+    </p:spTree>
+    <p:extLst>
+      <p:ext uri="{BB962C8B-B14F-4D97-AF65-F5344CB8AC3E}">
+        <p14:creationId xmlns:p14="http://schemas.microsoft.com/office/powerpoint/2010/main" val="1250170921"/>
       </p:ext>
     </p:extLst>
   </p:cSld>

</xml_diff>